<commit_message>
updated the tensorflow_eval with word-rnn-tensorflow details
</commit_message>
<xml_diff>
--- a/techreview/Fake Review Generator Technology Evaluation.pptx
+++ b/techreview/Fake Review Generator Technology Evaluation.pptx
@@ -115,6 +115,11 @@
       </a:defRPr>
     </a:lvl9pPr>
   </p:defaultTextStyle>
+  <p:extLst>
+    <p:ext uri="{EFAFB233-063F-42B5-8137-9DF3F51BA10A}">
+      <p15:sldGuideLst xmlns:p15="http://schemas.microsoft.com/office/powerpoint/2012/main"/>
+    </p:ext>
+  </p:extLst>
 </p:presentation>
 </file>
 
@@ -3792,7 +3797,7 @@
         </p:nvSpPr>
         <p:spPr>
           <a:xfrm>
-            <a:off x="1524000" y="1828800"/>
+            <a:off x="1524000" y="2021308"/>
             <a:ext cx="9144000" cy="3025068"/>
           </a:xfrm>
         </p:spPr>
@@ -4074,7 +4079,7 @@
             </a:pPr>
             <a:r>
               <a:rPr lang="en-US" dirty="0"/>
-              <a:t>Learning - Deep learning, </a:t>
+              <a:t>Learning – NLP, Deep learning, </a:t>
             </a:r>
             <a:r>
               <a:rPr lang="en-US" dirty="0" err="1"/>
@@ -4483,14 +4488,14 @@
             <p:ph idx="1"/>
             <p:extLst>
               <p:ext uri="{D42A27DB-BD31-4B8C-83A1-F6EECF244321}">
-                <p14:modId xmlns:p14="http://schemas.microsoft.com/office/powerpoint/2010/main" val="1486847702"/>
+                <p14:modId xmlns:p14="http://schemas.microsoft.com/office/powerpoint/2010/main" val="4266814458"/>
               </p:ext>
             </p:extLst>
           </p:nvPr>
         </p:nvGraphicFramePr>
         <p:xfrm>
-          <a:off x="251459" y="1016000"/>
-          <a:ext cx="11689081" cy="4826000"/>
+          <a:off x="251459" y="1325563"/>
+          <a:ext cx="11689081" cy="5046557"/>
         </p:xfrm>
         <a:graphic>
           <a:graphicData uri="http://schemas.openxmlformats.org/drawingml/2006/table">
@@ -4923,7 +4928,135 @@
                   </a:ext>
                 </a:extLst>
               </a:tr>
-              <a:tr h="756196">
+              <a:tr h="976753">
+                <a:tc>
+                  <a:txBody>
+                    <a:bodyPr/>
+                    <a:lstStyle/>
+                    <a:p>
+                      <a:r>
+                        <a:rPr lang="en-US" sz="1400" dirty="0"/>
+                        <a:t>word-</a:t>
+                      </a:r>
+                      <a:r>
+                        <a:rPr lang="en-US" sz="1400" dirty="0" err="1"/>
+                        <a:t>rnn</a:t>
+                      </a:r>
+                      <a:r>
+                        <a:rPr lang="en-US" sz="1400" dirty="0"/>
+                        <a:t>-</a:t>
+                      </a:r>
+                      <a:r>
+                        <a:rPr lang="en-US" sz="1400" dirty="0" err="1"/>
+                        <a:t>tensorflow</a:t>
+                      </a:r>
+                      <a:endParaRPr lang="en-US" sz="1400" dirty="0"/>
+                    </a:p>
+                  </a:txBody>
+                  <a:tcPr/>
+                </a:tc>
+                <a:tc>
+                  <a:txBody>
+                    <a:bodyPr/>
+                    <a:lstStyle/>
+                    <a:p>
+                      <a:r>
+                        <a:rPr lang="en-US" sz="1400" dirty="0"/>
+                        <a:t>2</a:t>
+                      </a:r>
+                    </a:p>
+                  </a:txBody>
+                  <a:tcPr/>
+                </a:tc>
+                <a:tc>
+                  <a:txBody>
+                    <a:bodyPr/>
+                    <a:lstStyle/>
+                    <a:p>
+                      <a:pPr marL="0" marR="0" lvl="0" indent="0" algn="l" defTabSz="914400" rtl="0" eaLnBrk="1" fontAlgn="auto" latinLnBrk="0" hangingPunct="1">
+                        <a:lnSpc>
+                          <a:spcPct val="100000"/>
+                        </a:lnSpc>
+                        <a:spcBef>
+                          <a:spcPts val="0"/>
+                        </a:spcBef>
+                        <a:spcAft>
+                          <a:spcPts val="0"/>
+                        </a:spcAft>
+                        <a:buClrTx/>
+                        <a:buSzTx/>
+                        <a:buFontTx/>
+                        <a:buNone/>
+                        <a:tabLst/>
+                        <a:defRPr/>
+                      </a:pPr>
+                      <a:r>
+                        <a:rPr lang="en-US" sz="1400" dirty="0"/>
+                        <a:t>Quality good</a:t>
+                      </a:r>
+                    </a:p>
+                  </a:txBody>
+                  <a:tcPr/>
+                </a:tc>
+                <a:tc>
+                  <a:txBody>
+                    <a:bodyPr/>
+                    <a:lstStyle/>
+                    <a:p>
+                      <a:r>
+                        <a:rPr lang="en-US" sz="1400" dirty="0"/>
+                        <a:t>Slow to train</a:t>
+                      </a:r>
+                    </a:p>
+                  </a:txBody>
+                  <a:tcPr/>
+                </a:tc>
+                <a:tc>
+                  <a:txBody>
+                    <a:bodyPr/>
+                    <a:lstStyle/>
+                    <a:p>
+                      <a:r>
+                        <a:rPr lang="en-US" sz="1400" dirty="0"/>
+                        <a:t>3.8</a:t>
+                      </a:r>
+                    </a:p>
+                  </a:txBody>
+                  <a:tcPr/>
+                </a:tc>
+                <a:tc>
+                  <a:txBody>
+                    <a:bodyPr/>
+                    <a:lstStyle/>
+                    <a:p>
+                      <a:r>
+                        <a:rPr lang="en-US" sz="1400" dirty="0"/>
+                        <a:t>50</a:t>
+                      </a:r>
+                    </a:p>
+                  </a:txBody>
+                  <a:tcPr/>
+                </a:tc>
+                <a:tc>
+                  <a:txBody>
+                    <a:bodyPr/>
+                    <a:lstStyle/>
+                    <a:p>
+                      <a:r>
+                        <a:rPr lang="en-US" sz="1400" dirty="0"/>
+                        <a:t>frat album soon its what is a criticism with it well have become a 75 not forget that things first purchase is angry sweet reckless and poorly</a:t>
+                      </a:r>
+                    </a:p>
+                  </a:txBody>
+                  <a:tcPr/>
+                </a:tc>
+                <a:extLst>
+                  <a:ext uri="{0D108BD9-81ED-4DB2-BD59-A6C34878D82A}">
+                    <a16:rowId xmlns:a16="http://schemas.microsoft.com/office/drawing/2014/main" val="657270731"/>
+                  </a:ext>
+                </a:extLst>
+              </a:tr>
+              <a:tr h="976753">
                 <a:tc>
                   <a:txBody>
                     <a:bodyPr/>
@@ -4949,7 +5082,7 @@
                     <a:p>
                       <a:r>
                         <a:rPr lang="en-US" sz="1400" dirty="0"/>
-                        <a:t>2</a:t>
+                        <a:t>3</a:t>
                       </a:r>
                     </a:p>
                   </a:txBody>
@@ -5077,135 +5210,7 @@
                 </a:tc>
                 <a:extLst>
                   <a:ext uri="{0D108BD9-81ED-4DB2-BD59-A6C34878D82A}">
-                    <a16:rowId xmlns:a16="http://schemas.microsoft.com/office/drawing/2014/main" val="599692593"/>
-                  </a:ext>
-                </a:extLst>
-              </a:tr>
-              <a:tr h="976753">
-                <a:tc>
-                  <a:txBody>
-                    <a:bodyPr/>
-                    <a:lstStyle/>
-                    <a:p>
-                      <a:r>
-                        <a:rPr lang="en-US" sz="1400" dirty="0"/>
-                        <a:t>word-</a:t>
-                      </a:r>
-                      <a:r>
-                        <a:rPr lang="en-US" sz="1400" dirty="0" err="1"/>
-                        <a:t>rnn</a:t>
-                      </a:r>
-                      <a:r>
-                        <a:rPr lang="en-US" sz="1400" dirty="0"/>
-                        <a:t>-</a:t>
-                      </a:r>
-                      <a:r>
-                        <a:rPr lang="en-US" sz="1400" dirty="0" err="1"/>
-                        <a:t>tensorflow</a:t>
-                      </a:r>
-                      <a:endParaRPr lang="en-US" sz="1400" dirty="0"/>
-                    </a:p>
-                  </a:txBody>
-                  <a:tcPr/>
-                </a:tc>
-                <a:tc>
-                  <a:txBody>
-                    <a:bodyPr/>
-                    <a:lstStyle/>
-                    <a:p>
-                      <a:r>
-                        <a:rPr lang="en-US" sz="1400" dirty="0"/>
-                        <a:t>3</a:t>
-                      </a:r>
-                    </a:p>
-                  </a:txBody>
-                  <a:tcPr/>
-                </a:tc>
-                <a:tc>
-                  <a:txBody>
-                    <a:bodyPr/>
-                    <a:lstStyle/>
-                    <a:p>
-                      <a:pPr marL="0" marR="0" lvl="0" indent="0" algn="l" defTabSz="914400" rtl="0" eaLnBrk="1" fontAlgn="auto" latinLnBrk="0" hangingPunct="1">
-                        <a:lnSpc>
-                          <a:spcPct val="100000"/>
-                        </a:lnSpc>
-                        <a:spcBef>
-                          <a:spcPts val="0"/>
-                        </a:spcBef>
-                        <a:spcAft>
-                          <a:spcPts val="0"/>
-                        </a:spcAft>
-                        <a:buClrTx/>
-                        <a:buSzTx/>
-                        <a:buFontTx/>
-                        <a:buNone/>
-                        <a:tabLst/>
-                        <a:defRPr/>
-                      </a:pPr>
-                      <a:r>
-                        <a:rPr lang="en-US" sz="1400" dirty="0"/>
-                        <a:t>Quality good</a:t>
-                      </a:r>
-                    </a:p>
-                  </a:txBody>
-                  <a:tcPr/>
-                </a:tc>
-                <a:tc>
-                  <a:txBody>
-                    <a:bodyPr/>
-                    <a:lstStyle/>
-                    <a:p>
-                      <a:r>
-                        <a:rPr lang="en-US" sz="1400" dirty="0"/>
-                        <a:t>Slow to train</a:t>
-                      </a:r>
-                    </a:p>
-                  </a:txBody>
-                  <a:tcPr/>
-                </a:tc>
-                <a:tc>
-                  <a:txBody>
-                    <a:bodyPr/>
-                    <a:lstStyle/>
-                    <a:p>
-                      <a:r>
-                        <a:rPr lang="en-US" sz="1400" dirty="0"/>
-                        <a:t>3.8</a:t>
-                      </a:r>
-                    </a:p>
-                  </a:txBody>
-                  <a:tcPr/>
-                </a:tc>
-                <a:tc>
-                  <a:txBody>
-                    <a:bodyPr/>
-                    <a:lstStyle/>
-                    <a:p>
-                      <a:r>
-                        <a:rPr lang="en-US" sz="1400" dirty="0"/>
-                        <a:t>50</a:t>
-                      </a:r>
-                    </a:p>
-                  </a:txBody>
-                  <a:tcPr/>
-                </a:tc>
-                <a:tc>
-                  <a:txBody>
-                    <a:bodyPr/>
-                    <a:lstStyle/>
-                    <a:p>
-                      <a:r>
-                        <a:rPr lang="en-US" sz="1400" dirty="0"/>
-                        <a:t>frat album soon its what is a criticism with it well have become a 75 not forget that things first purchase is angry sweet reckless and poorly</a:t>
-                      </a:r>
-                    </a:p>
-                  </a:txBody>
-                  <a:tcPr/>
-                </a:tc>
-                <a:extLst>
-                  <a:ext uri="{0D108BD9-81ED-4DB2-BD59-A6C34878D82A}">
-                    <a16:rowId xmlns:a16="http://schemas.microsoft.com/office/drawing/2014/main" val="657270731"/>
+                    <a16:rowId xmlns:a16="http://schemas.microsoft.com/office/drawing/2014/main" val="1572595743"/>
                   </a:ext>
                 </a:extLst>
               </a:tr>

</xml_diff>

<commit_message>
adding score to model evaluation
</commit_message>
<xml_diff>
--- a/techreview/Fake Review Generator Technology Evaluation.pptx
+++ b/techreview/Fake Review Generator Technology Evaluation.pptx
@@ -5,18 +5,19 @@
     <p:sldMasterId id="2147483648" r:id="rId1"/>
   </p:sldMasterIdLst>
   <p:notesMasterIdLst>
-    <p:notesMasterId r:id="rId11"/>
+    <p:notesMasterId r:id="rId12"/>
   </p:notesMasterIdLst>
   <p:sldIdLst>
     <p:sldId id="256" r:id="rId2"/>
     <p:sldId id="258" r:id="rId3"/>
     <p:sldId id="257" r:id="rId4"/>
-    <p:sldId id="266" r:id="rId5"/>
-    <p:sldId id="261" r:id="rId6"/>
-    <p:sldId id="259" r:id="rId7"/>
-    <p:sldId id="263" r:id="rId8"/>
-    <p:sldId id="265" r:id="rId9"/>
-    <p:sldId id="264" r:id="rId10"/>
+    <p:sldId id="267" r:id="rId5"/>
+    <p:sldId id="266" r:id="rId6"/>
+    <p:sldId id="261" r:id="rId7"/>
+    <p:sldId id="259" r:id="rId8"/>
+    <p:sldId id="263" r:id="rId9"/>
+    <p:sldId id="265" r:id="rId10"/>
+    <p:sldId id="264" r:id="rId11"/>
   </p:sldIdLst>
   <p:sldSz cx="12192000" cy="6858000"/>
   <p:notesSz cx="6858000" cy="9144000"/>
@@ -205,7 +206,7 @@
           <a:p>
             <a:fld id="{4F421B9D-43B0-4EA9-9BC4-B42F90B145FA}" type="datetimeFigureOut">
               <a:rPr lang="en-US" smtClean="0"/>
-              <a:t>5/8/2018</a:t>
+              <a:t>5/13/2018</a:t>
             </a:fld>
             <a:endParaRPr lang="en-US"/>
           </a:p>
@@ -712,7 +713,7 @@
           <a:p>
             <a:fld id="{9C83DF64-CF86-4C4E-87F6-A10972E74DBD}" type="datetimeFigureOut">
               <a:rPr lang="en-US" smtClean="0"/>
-              <a:t>5/8/2018</a:t>
+              <a:t>5/13/2018</a:t>
             </a:fld>
             <a:endParaRPr lang="en-US"/>
           </a:p>
@@ -910,7 +911,7 @@
           <a:p>
             <a:fld id="{9C83DF64-CF86-4C4E-87F6-A10972E74DBD}" type="datetimeFigureOut">
               <a:rPr lang="en-US" smtClean="0"/>
-              <a:t>5/8/2018</a:t>
+              <a:t>5/13/2018</a:t>
             </a:fld>
             <a:endParaRPr lang="en-US"/>
           </a:p>
@@ -1118,7 +1119,7 @@
           <a:p>
             <a:fld id="{9C83DF64-CF86-4C4E-87F6-A10972E74DBD}" type="datetimeFigureOut">
               <a:rPr lang="en-US" smtClean="0"/>
-              <a:t>5/8/2018</a:t>
+              <a:t>5/13/2018</a:t>
             </a:fld>
             <a:endParaRPr lang="en-US"/>
           </a:p>
@@ -1316,7 +1317,7 @@
           <a:p>
             <a:fld id="{9C83DF64-CF86-4C4E-87F6-A10972E74DBD}" type="datetimeFigureOut">
               <a:rPr lang="en-US" smtClean="0"/>
-              <a:t>5/8/2018</a:t>
+              <a:t>5/13/2018</a:t>
             </a:fld>
             <a:endParaRPr lang="en-US"/>
           </a:p>
@@ -1591,7 +1592,7 @@
           <a:p>
             <a:fld id="{9C83DF64-CF86-4C4E-87F6-A10972E74DBD}" type="datetimeFigureOut">
               <a:rPr lang="en-US" smtClean="0"/>
-              <a:t>5/8/2018</a:t>
+              <a:t>5/13/2018</a:t>
             </a:fld>
             <a:endParaRPr lang="en-US"/>
           </a:p>
@@ -1856,7 +1857,7 @@
           <a:p>
             <a:fld id="{9C83DF64-CF86-4C4E-87F6-A10972E74DBD}" type="datetimeFigureOut">
               <a:rPr lang="en-US" smtClean="0"/>
-              <a:t>5/8/2018</a:t>
+              <a:t>5/13/2018</a:t>
             </a:fld>
             <a:endParaRPr lang="en-US"/>
           </a:p>
@@ -2268,7 +2269,7 @@
           <a:p>
             <a:fld id="{9C83DF64-CF86-4C4E-87F6-A10972E74DBD}" type="datetimeFigureOut">
               <a:rPr lang="en-US" smtClean="0"/>
-              <a:t>5/8/2018</a:t>
+              <a:t>5/13/2018</a:t>
             </a:fld>
             <a:endParaRPr lang="en-US"/>
           </a:p>
@@ -2409,7 +2410,7 @@
           <a:p>
             <a:fld id="{9C83DF64-CF86-4C4E-87F6-A10972E74DBD}" type="datetimeFigureOut">
               <a:rPr lang="en-US" smtClean="0"/>
-              <a:t>5/8/2018</a:t>
+              <a:t>5/13/2018</a:t>
             </a:fld>
             <a:endParaRPr lang="en-US"/>
           </a:p>
@@ -2522,7 +2523,7 @@
           <a:p>
             <a:fld id="{9C83DF64-CF86-4C4E-87F6-A10972E74DBD}" type="datetimeFigureOut">
               <a:rPr lang="en-US" smtClean="0"/>
-              <a:t>5/8/2018</a:t>
+              <a:t>5/13/2018</a:t>
             </a:fld>
             <a:endParaRPr lang="en-US"/>
           </a:p>
@@ -2833,7 +2834,7 @@
           <a:p>
             <a:fld id="{9C83DF64-CF86-4C4E-87F6-A10972E74DBD}" type="datetimeFigureOut">
               <a:rPr lang="en-US" smtClean="0"/>
-              <a:t>5/8/2018</a:t>
+              <a:t>5/13/2018</a:t>
             </a:fld>
             <a:endParaRPr lang="en-US"/>
           </a:p>
@@ -3121,7 +3122,7 @@
           <a:p>
             <a:fld id="{9C83DF64-CF86-4C4E-87F6-A10972E74DBD}" type="datetimeFigureOut">
               <a:rPr lang="en-US" smtClean="0"/>
-              <a:t>5/8/2018</a:t>
+              <a:t>5/13/2018</a:t>
             </a:fld>
             <a:endParaRPr lang="en-US"/>
           </a:p>
@@ -3362,7 +3363,7 @@
           <a:p>
             <a:fld id="{9C83DF64-CF86-4C4E-87F6-A10972E74DBD}" type="datetimeFigureOut">
               <a:rPr lang="en-US" smtClean="0"/>
-              <a:t>5/8/2018</a:t>
+              <a:t>5/13/2018</a:t>
             </a:fld>
             <a:endParaRPr lang="en-US"/>
           </a:p>
@@ -3918,6 +3919,228 @@
     <p:extLst>
       <p:ext uri="{BB962C8B-B14F-4D97-AF65-F5344CB8AC3E}">
         <p14:creationId xmlns:p14="http://schemas.microsoft.com/office/powerpoint/2010/main" val="12299816"/>
+      </p:ext>
+    </p:extLst>
+  </p:cSld>
+  <p:clrMapOvr>
+    <a:masterClrMapping/>
+  </p:clrMapOvr>
+</p:sld>
+</file>
+
+<file path=ppt/slides/slide10.xml><?xml version="1.0" encoding="utf-8"?>
+<p:sld xmlns:a="http://schemas.openxmlformats.org/drawingml/2006/main" xmlns:r="http://schemas.openxmlformats.org/officeDocument/2006/relationships" xmlns:p="http://schemas.openxmlformats.org/presentationml/2006/main">
+  <p:cSld>
+    <p:spTree>
+      <p:nvGrpSpPr>
+        <p:cNvPr id="1" name=""/>
+        <p:cNvGrpSpPr/>
+        <p:nvPr/>
+      </p:nvGrpSpPr>
+      <p:grpSpPr>
+        <a:xfrm>
+          <a:off x="0" y="0"/>
+          <a:ext cx="0" cy="0"/>
+          <a:chOff x="0" y="0"/>
+          <a:chExt cx="0" cy="0"/>
+        </a:xfrm>
+      </p:grpSpPr>
+      <p:sp>
+        <p:nvSpPr>
+          <p:cNvPr id="2" name="Title 1">
+            <a:extLst>
+              <a:ext uri="{FF2B5EF4-FFF2-40B4-BE49-F238E27FC236}">
+                <a16:creationId xmlns:a16="http://schemas.microsoft.com/office/drawing/2014/main" id="{322BE2FF-A4CF-42BB-B3D0-6A01C9DA0C2A}"/>
+              </a:ext>
+            </a:extLst>
+          </p:cNvPr>
+          <p:cNvSpPr>
+            <a:spLocks noGrp="1"/>
+          </p:cNvSpPr>
+          <p:nvPr>
+            <p:ph type="title"/>
+          </p:nvPr>
+        </p:nvSpPr>
+        <p:spPr>
+          <a:xfrm>
+            <a:off x="0" y="18255"/>
+            <a:ext cx="10515600" cy="1325563"/>
+          </a:xfrm>
+        </p:spPr>
+        <p:txBody>
+          <a:bodyPr/>
+          <a:lstStyle/>
+          <a:p>
+            <a:r>
+              <a:rPr lang="en-US" dirty="0" err="1"/>
+              <a:t>Keras</a:t>
+            </a:r>
+            <a:r>
+              <a:rPr lang="en-US" dirty="0"/>
+              <a:t> evaluation</a:t>
+            </a:r>
+          </a:p>
+        </p:txBody>
+      </p:sp>
+      <p:sp>
+        <p:nvSpPr>
+          <p:cNvPr id="3" name="Content Placeholder 2">
+            <a:extLst>
+              <a:ext uri="{FF2B5EF4-FFF2-40B4-BE49-F238E27FC236}">
+                <a16:creationId xmlns:a16="http://schemas.microsoft.com/office/drawing/2014/main" id="{BA479CED-2A2D-4262-AFEC-6CEB19121B36}"/>
+              </a:ext>
+            </a:extLst>
+          </p:cNvPr>
+          <p:cNvSpPr>
+            <a:spLocks noGrp="1"/>
+          </p:cNvSpPr>
+          <p:nvPr>
+            <p:ph idx="1"/>
+          </p:nvPr>
+        </p:nvSpPr>
+        <p:spPr>
+          <a:xfrm>
+            <a:off x="477672" y="1241946"/>
+            <a:ext cx="11614244" cy="4935017"/>
+          </a:xfrm>
+        </p:spPr>
+        <p:txBody>
+          <a:bodyPr>
+            <a:normAutofit/>
+          </a:bodyPr>
+          <a:lstStyle/>
+          <a:p>
+            <a:pPr marL="0" indent="0">
+              <a:buNone/>
+            </a:pPr>
+            <a:r>
+              <a:rPr lang="en-US" b="1" dirty="0"/>
+              <a:t>Model Name: </a:t>
+            </a:r>
+            <a:r>
+              <a:rPr lang="en-US" dirty="0" err="1"/>
+              <a:t>Keras</a:t>
+            </a:r>
+            <a:endParaRPr lang="en-US" dirty="0"/>
+          </a:p>
+          <a:p>
+            <a:pPr marL="0" indent="0">
+              <a:buNone/>
+            </a:pPr>
+            <a:r>
+              <a:rPr lang="en-US" b="1" dirty="0"/>
+              <a:t>GitHub Repo: </a:t>
+            </a:r>
+            <a:r>
+              <a:rPr lang="en-US" dirty="0"/>
+              <a:t>https://github.com/keras-team/keras</a:t>
+            </a:r>
+          </a:p>
+          <a:p>
+            <a:pPr marL="0" indent="0">
+              <a:buNone/>
+            </a:pPr>
+            <a:r>
+              <a:rPr lang="en-US" b="1" dirty="0"/>
+              <a:t>Run </a:t>
+            </a:r>
+            <a:r>
+              <a:rPr lang="en-US" dirty="0"/>
+              <a:t>- 1</a:t>
+            </a:r>
+          </a:p>
+          <a:p>
+            <a:pPr marL="0" indent="0">
+              <a:buNone/>
+            </a:pPr>
+            <a:r>
+              <a:rPr lang="en-US" b="1" dirty="0"/>
+              <a:t>Time to run</a:t>
+            </a:r>
+            <a:r>
+              <a:rPr lang="en-US" dirty="0"/>
+              <a:t>: 60 </a:t>
+            </a:r>
+            <a:r>
+              <a:rPr lang="en-US" dirty="0" err="1"/>
+              <a:t>hrs</a:t>
+            </a:r>
+            <a:r>
+              <a:rPr lang="en-US" dirty="0"/>
+              <a:t> on AWS if run</a:t>
+            </a:r>
+          </a:p>
+          <a:p>
+            <a:pPr marL="0" indent="0">
+              <a:buNone/>
+            </a:pPr>
+            <a:r>
+              <a:rPr lang="en-US" b="1" dirty="0"/>
+              <a:t>Data Set Size</a:t>
+            </a:r>
+            <a:r>
+              <a:rPr lang="en-US" dirty="0"/>
+              <a:t>: no special characters - 70mb</a:t>
+            </a:r>
+          </a:p>
+          <a:p>
+            <a:pPr marL="0" indent="0">
+              <a:buNone/>
+            </a:pPr>
+            <a:r>
+              <a:rPr lang="en-US" b="1" dirty="0"/>
+              <a:t>Quality of output</a:t>
+            </a:r>
+            <a:r>
+              <a:rPr lang="en-US" dirty="0"/>
+              <a:t>: NA</a:t>
+            </a:r>
+          </a:p>
+          <a:p>
+            <a:pPr marL="0" indent="0">
+              <a:buNone/>
+            </a:pPr>
+            <a:r>
+              <a:rPr lang="en-US" b="1" dirty="0"/>
+              <a:t>No of epochs</a:t>
+            </a:r>
+            <a:r>
+              <a:rPr lang="en-US" dirty="0"/>
+              <a:t>: 60</a:t>
+            </a:r>
+          </a:p>
+          <a:p>
+            <a:pPr marL="0" indent="0">
+              <a:buNone/>
+            </a:pPr>
+            <a:r>
+              <a:rPr lang="en-US" b="1" dirty="0"/>
+              <a:t>Final Train Loss</a:t>
+            </a:r>
+            <a:r>
+              <a:rPr lang="en-US" dirty="0"/>
+              <a:t>: NA</a:t>
+            </a:r>
+          </a:p>
+          <a:p>
+            <a:pPr marL="0" indent="0">
+              <a:buNone/>
+            </a:pPr>
+            <a:r>
+              <a:rPr lang="en-US" b="1" dirty="0"/>
+              <a:t>Conclusion</a:t>
+            </a:r>
+            <a:r>
+              <a:rPr lang="en-US" dirty="0"/>
+              <a:t>: Very slow. Training will not finish </a:t>
+            </a:r>
+          </a:p>
+        </p:txBody>
+      </p:sp>
+    </p:spTree>
+    <p:extLst>
+      <p:ext uri="{BB962C8B-B14F-4D97-AF65-F5344CB8AC3E}">
+        <p14:creationId xmlns:p14="http://schemas.microsoft.com/office/powerpoint/2010/main" val="1998563858"/>
       </p:ext>
     </p:extLst>
   </p:cSld>
@@ -4488,7 +4711,7 @@
             <p:ph idx="1"/>
             <p:extLst>
               <p:ext uri="{D42A27DB-BD31-4B8C-83A1-F6EECF244321}">
-                <p14:modId xmlns:p14="http://schemas.microsoft.com/office/powerpoint/2010/main" val="4266814458"/>
+                <p14:modId xmlns:p14="http://schemas.microsoft.com/office/powerpoint/2010/main" val="1264066332"/>
               </p:ext>
             </p:extLst>
           </p:nvPr>
@@ -5358,7 +5581,7 @@
           <p:cNvPr id="2" name="Title 1">
             <a:extLst>
               <a:ext uri="{FF2B5EF4-FFF2-40B4-BE49-F238E27FC236}">
-                <a16:creationId xmlns:a16="http://schemas.microsoft.com/office/drawing/2014/main" id="{5588671A-D4B8-4227-B351-5C033E2A6025}"/>
+                <a16:creationId xmlns:a16="http://schemas.microsoft.com/office/drawing/2014/main" id="{0205BF77-7FB0-483E-ABB9-3A0075990B69}"/>
               </a:ext>
             </a:extLst>
           </p:cNvPr>
@@ -5376,55 +5599,890 @@
           <a:p>
             <a:r>
               <a:rPr lang="en-US" dirty="0"/>
-              <a:t>Next Evaluation Steps</a:t>
-            </a:r>
-          </a:p>
-        </p:txBody>
-      </p:sp>
-      <p:sp>
-        <p:nvSpPr>
-          <p:cNvPr id="3" name="Content Placeholder 2">
-            <a:extLst>
-              <a:ext uri="{FF2B5EF4-FFF2-40B4-BE49-F238E27FC236}">
-                <a16:creationId xmlns:a16="http://schemas.microsoft.com/office/drawing/2014/main" id="{1E548DD6-CD28-4F65-8A95-06E8FBD8D25E}"/>
-              </a:ext>
-            </a:extLst>
-          </p:cNvPr>
-          <p:cNvSpPr>
-            <a:spLocks noGrp="1"/>
-          </p:cNvSpPr>
+              <a:t>Final Evaluation</a:t>
+            </a:r>
+          </a:p>
+        </p:txBody>
+      </p:sp>
+      <p:graphicFrame>
+        <p:nvGraphicFramePr>
+          <p:cNvPr id="4" name="Content Placeholder 3">
+            <a:extLst>
+              <a:ext uri="{FF2B5EF4-FFF2-40B4-BE49-F238E27FC236}">
+                <a16:creationId xmlns:a16="http://schemas.microsoft.com/office/drawing/2014/main" id="{FEAB2E96-80E0-4688-BD97-B52C2926D753}"/>
+              </a:ext>
+            </a:extLst>
+          </p:cNvPr>
+          <p:cNvGraphicFramePr>
+            <a:graphicFrameLocks noGrp="1"/>
+          </p:cNvGraphicFramePr>
           <p:nvPr>
             <p:ph idx="1"/>
-          </p:nvPr>
-        </p:nvSpPr>
-        <p:spPr/>
-        <p:txBody>
-          <a:bodyPr/>
+            <p:extLst>
+              <p:ext uri="{D42A27DB-BD31-4B8C-83A1-F6EECF244321}">
+                <p14:modId xmlns:p14="http://schemas.microsoft.com/office/powerpoint/2010/main" val="3589061321"/>
+              </p:ext>
+            </p:extLst>
+          </p:nvPr>
+        </p:nvGraphicFramePr>
+        <p:xfrm>
+          <a:off x="838199" y="3162196"/>
+          <a:ext cx="10235739" cy="1840110"/>
+        </p:xfrm>
+        <a:graphic>
+          <a:graphicData uri="http://schemas.openxmlformats.org/drawingml/2006/table">
+            <a:tbl>
+              <a:tblPr>
+                <a:tableStyleId>{21E4AEA4-8DFA-4A89-87EB-49C32662AFE0}</a:tableStyleId>
+              </a:tblPr>
+              <a:tblGrid>
+                <a:gridCol w="2265988">
+                  <a:extLst>
+                    <a:ext uri="{9D8B030D-6E8A-4147-A177-3AD203B41FA5}">
+                      <a16:colId xmlns:a16="http://schemas.microsoft.com/office/drawing/2014/main" val="1752440842"/>
+                    </a:ext>
+                  </a:extLst>
+                </a:gridCol>
+                <a:gridCol w="1503600">
+                  <a:extLst>
+                    <a:ext uri="{9D8B030D-6E8A-4147-A177-3AD203B41FA5}">
+                      <a16:colId xmlns:a16="http://schemas.microsoft.com/office/drawing/2014/main" val="2323189016"/>
+                    </a:ext>
+                  </a:extLst>
+                </a:gridCol>
+                <a:gridCol w="1016518">
+                  <a:extLst>
+                    <a:ext uri="{9D8B030D-6E8A-4147-A177-3AD203B41FA5}">
+                      <a16:colId xmlns:a16="http://schemas.microsoft.com/office/drawing/2014/main" val="976900329"/>
+                    </a:ext>
+                  </a:extLst>
+                </a:gridCol>
+                <a:gridCol w="1283139">
+                  <a:extLst>
+                    <a:ext uri="{9D8B030D-6E8A-4147-A177-3AD203B41FA5}">
+                      <a16:colId xmlns:a16="http://schemas.microsoft.com/office/drawing/2014/main" val="2615979777"/>
+                    </a:ext>
+                  </a:extLst>
+                </a:gridCol>
+                <a:gridCol w="1334180">
+                  <a:extLst>
+                    <a:ext uri="{9D8B030D-6E8A-4147-A177-3AD203B41FA5}">
+                      <a16:colId xmlns:a16="http://schemas.microsoft.com/office/drawing/2014/main" val="569946685"/>
+                    </a:ext>
+                  </a:extLst>
+                </a:gridCol>
+                <a:gridCol w="1712405">
+                  <a:extLst>
+                    <a:ext uri="{9D8B030D-6E8A-4147-A177-3AD203B41FA5}">
+                      <a16:colId xmlns:a16="http://schemas.microsoft.com/office/drawing/2014/main" val="2513546949"/>
+                    </a:ext>
+                  </a:extLst>
+                </a:gridCol>
+                <a:gridCol w="1119909">
+                  <a:extLst>
+                    <a:ext uri="{9D8B030D-6E8A-4147-A177-3AD203B41FA5}">
+                      <a16:colId xmlns:a16="http://schemas.microsoft.com/office/drawing/2014/main" val="2174169942"/>
+                    </a:ext>
+                  </a:extLst>
+                </a:gridCol>
+              </a:tblGrid>
+              <a:tr h="613370">
+                <a:tc>
+                  <a:txBody>
+                    <a:bodyPr/>
+                    <a:lstStyle/>
+                    <a:p>
+                      <a:pPr algn="l" fontAlgn="b"/>
+                      <a:endParaRPr lang="en-US" sz="1600" b="0" i="0" u="none" strike="noStrike" dirty="0">
+                        <a:solidFill>
+                          <a:srgbClr val="000000"/>
+                        </a:solidFill>
+                        <a:effectLst/>
+                        <a:latin typeface="Segoe UI" panose="020B0502040204020203" pitchFamily="34" charset="0"/>
+                        <a:cs typeface="Segoe UI" panose="020B0502040204020203" pitchFamily="34" charset="0"/>
+                      </a:endParaRPr>
+                    </a:p>
+                  </a:txBody>
+                  <a:tcPr marL="7620" marR="7620" marT="7620" marB="0" anchor="b"/>
+                </a:tc>
+                <a:tc>
+                  <a:txBody>
+                    <a:bodyPr/>
+                    <a:lstStyle/>
+                    <a:p>
+                      <a:pPr algn="l" fontAlgn="b"/>
+                      <a:r>
+                        <a:rPr lang="en-US" sz="1600" u="none" strike="noStrike">
+                          <a:effectLst/>
+                          <a:latin typeface="Segoe UI" panose="020B0502040204020203" pitchFamily="34" charset="0"/>
+                          <a:cs typeface="Segoe UI" panose="020B0502040204020203" pitchFamily="34" charset="0"/>
+                        </a:rPr>
+                        <a:t>Train Loss</a:t>
+                      </a:r>
+                      <a:endParaRPr lang="en-US" sz="1600" b="0" i="0" u="none" strike="noStrike">
+                        <a:solidFill>
+                          <a:srgbClr val="000000"/>
+                        </a:solidFill>
+                        <a:effectLst/>
+                        <a:latin typeface="Segoe UI" panose="020B0502040204020203" pitchFamily="34" charset="0"/>
+                        <a:cs typeface="Segoe UI" panose="020B0502040204020203" pitchFamily="34" charset="0"/>
+                      </a:endParaRPr>
+                    </a:p>
+                  </a:txBody>
+                  <a:tcPr marL="7620" marR="7620" marT="7620" marB="0" anchor="b"/>
+                </a:tc>
+                <a:tc>
+                  <a:txBody>
+                    <a:bodyPr/>
+                    <a:lstStyle/>
+                    <a:p>
+                      <a:pPr algn="l" fontAlgn="b"/>
+                      <a:r>
+                        <a:rPr lang="en-US" sz="1600" u="none" strike="noStrike">
+                          <a:effectLst/>
+                          <a:latin typeface="Segoe UI" panose="020B0502040204020203" pitchFamily="34" charset="0"/>
+                          <a:cs typeface="Segoe UI" panose="020B0502040204020203" pitchFamily="34" charset="0"/>
+                        </a:rPr>
+                        <a:t>Epoch</a:t>
+                      </a:r>
+                      <a:endParaRPr lang="en-US" sz="1600" b="0" i="0" u="none" strike="noStrike">
+                        <a:solidFill>
+                          <a:srgbClr val="000000"/>
+                        </a:solidFill>
+                        <a:effectLst/>
+                        <a:latin typeface="Segoe UI" panose="020B0502040204020203" pitchFamily="34" charset="0"/>
+                        <a:cs typeface="Segoe UI" panose="020B0502040204020203" pitchFamily="34" charset="0"/>
+                      </a:endParaRPr>
+                    </a:p>
+                  </a:txBody>
+                  <a:tcPr marL="7620" marR="7620" marT="7620" marB="0" anchor="b"/>
+                </a:tc>
+                <a:tc>
+                  <a:txBody>
+                    <a:bodyPr/>
+                    <a:lstStyle/>
+                    <a:p>
+                      <a:pPr algn="l" fontAlgn="b"/>
+                      <a:r>
+                        <a:rPr lang="en-US" sz="1600" u="none" strike="noStrike" dirty="0">
+                          <a:effectLst/>
+                          <a:latin typeface="Segoe UI" panose="020B0502040204020203" pitchFamily="34" charset="0"/>
+                          <a:cs typeface="Segoe UI" panose="020B0502040204020203" pitchFamily="34" charset="0"/>
+                        </a:rPr>
+                        <a:t>Time to run</a:t>
+                      </a:r>
+                    </a:p>
+                    <a:p>
+                      <a:pPr algn="l" fontAlgn="b"/>
+                      <a:r>
+                        <a:rPr lang="en-US" sz="1600" b="0" i="0" u="none" strike="noStrike" dirty="0">
+                          <a:solidFill>
+                            <a:srgbClr val="000000"/>
+                          </a:solidFill>
+                          <a:effectLst/>
+                          <a:latin typeface="Segoe UI" panose="020B0502040204020203" pitchFamily="34" charset="0"/>
+                          <a:cs typeface="Segoe UI" panose="020B0502040204020203" pitchFamily="34" charset="0"/>
+                        </a:rPr>
+                        <a:t>(Mins)</a:t>
+                      </a:r>
+                    </a:p>
+                  </a:txBody>
+                  <a:tcPr marL="7620" marR="7620" marT="7620" marB="0" anchor="b"/>
+                </a:tc>
+                <a:tc>
+                  <a:txBody>
+                    <a:bodyPr/>
+                    <a:lstStyle/>
+                    <a:p>
+                      <a:pPr algn="l" fontAlgn="b"/>
+                      <a:r>
+                        <a:rPr lang="en-US" sz="1600" u="none" strike="noStrike">
+                          <a:effectLst/>
+                          <a:latin typeface="Segoe UI" panose="020B0502040204020203" pitchFamily="34" charset="0"/>
+                          <a:cs typeface="Segoe UI" panose="020B0502040204020203" pitchFamily="34" charset="0"/>
+                        </a:rPr>
+                        <a:t>Spelling Error</a:t>
+                      </a:r>
+                      <a:endParaRPr lang="en-US" sz="1600" b="0" i="0" u="none" strike="noStrike">
+                        <a:solidFill>
+                          <a:srgbClr val="000000"/>
+                        </a:solidFill>
+                        <a:effectLst/>
+                        <a:latin typeface="Segoe UI" panose="020B0502040204020203" pitchFamily="34" charset="0"/>
+                        <a:cs typeface="Segoe UI" panose="020B0502040204020203" pitchFamily="34" charset="0"/>
+                      </a:endParaRPr>
+                    </a:p>
+                  </a:txBody>
+                  <a:tcPr marL="7620" marR="7620" marT="7620" marB="0" anchor="b"/>
+                </a:tc>
+                <a:tc>
+                  <a:txBody>
+                    <a:bodyPr/>
+                    <a:lstStyle/>
+                    <a:p>
+                      <a:pPr algn="l" fontAlgn="b"/>
+                      <a:r>
+                        <a:rPr lang="en-US" sz="1600" u="none" strike="noStrike">
+                          <a:effectLst/>
+                          <a:latin typeface="Segoe UI" panose="020B0502040204020203" pitchFamily="34" charset="0"/>
+                          <a:cs typeface="Segoe UI" panose="020B0502040204020203" pitchFamily="34" charset="0"/>
+                        </a:rPr>
+                        <a:t>Related work (1-5)</a:t>
+                      </a:r>
+                      <a:endParaRPr lang="en-US" sz="1600" b="0" i="0" u="none" strike="noStrike">
+                        <a:solidFill>
+                          <a:srgbClr val="000000"/>
+                        </a:solidFill>
+                        <a:effectLst/>
+                        <a:latin typeface="Segoe UI" panose="020B0502040204020203" pitchFamily="34" charset="0"/>
+                        <a:cs typeface="Segoe UI" panose="020B0502040204020203" pitchFamily="34" charset="0"/>
+                      </a:endParaRPr>
+                    </a:p>
+                  </a:txBody>
+                  <a:tcPr marL="7620" marR="7620" marT="7620" marB="0" anchor="b"/>
+                </a:tc>
+                <a:tc>
+                  <a:txBody>
+                    <a:bodyPr/>
+                    <a:lstStyle/>
+                    <a:p>
+                      <a:pPr algn="l" fontAlgn="b"/>
+                      <a:r>
+                        <a:rPr lang="en-US" sz="1600" u="none" strike="noStrike" dirty="0">
+                          <a:effectLst/>
+                          <a:latin typeface="Segoe UI" panose="020B0502040204020203" pitchFamily="34" charset="0"/>
+                          <a:cs typeface="Segoe UI" panose="020B0502040204020203" pitchFamily="34" charset="0"/>
+                        </a:rPr>
+                        <a:t>Score</a:t>
+                      </a:r>
+                    </a:p>
+                    <a:p>
+                      <a:pPr algn="l" fontAlgn="b"/>
+                      <a:endParaRPr lang="en-US" sz="1600" b="0" i="0" u="none" strike="noStrike" dirty="0">
+                        <a:solidFill>
+                          <a:srgbClr val="000000"/>
+                        </a:solidFill>
+                        <a:effectLst/>
+                        <a:latin typeface="Segoe UI" panose="020B0502040204020203" pitchFamily="34" charset="0"/>
+                        <a:cs typeface="Segoe UI" panose="020B0502040204020203" pitchFamily="34" charset="0"/>
+                      </a:endParaRPr>
+                    </a:p>
+                  </a:txBody>
+                  <a:tcPr marL="7620" marR="7620" marT="7620" marB="0" anchor="b"/>
+                </a:tc>
+                <a:extLst>
+                  <a:ext uri="{0D108BD9-81ED-4DB2-BD59-A6C34878D82A}">
+                    <a16:rowId xmlns:a16="http://schemas.microsoft.com/office/drawing/2014/main" val="2543262589"/>
+                  </a:ext>
+                </a:extLst>
+              </a:tr>
+              <a:tr h="613370">
+                <a:tc>
+                  <a:txBody>
+                    <a:bodyPr/>
+                    <a:lstStyle/>
+                    <a:p>
+                      <a:pPr algn="l" fontAlgn="b"/>
+                      <a:r>
+                        <a:rPr lang="en-US" sz="1600" u="none" strike="noStrike">
+                          <a:effectLst/>
+                          <a:latin typeface="Segoe UI" panose="020B0502040204020203" pitchFamily="34" charset="0"/>
+                          <a:cs typeface="Segoe UI" panose="020B0502040204020203" pitchFamily="34" charset="0"/>
+                        </a:rPr>
+                        <a:t>word-rnn</a:t>
+                      </a:r>
+                      <a:endParaRPr lang="en-US" sz="1600" b="0" i="0" u="none" strike="noStrike">
+                        <a:solidFill>
+                          <a:srgbClr val="000000"/>
+                        </a:solidFill>
+                        <a:effectLst/>
+                        <a:latin typeface="Segoe UI" panose="020B0502040204020203" pitchFamily="34" charset="0"/>
+                        <a:cs typeface="Segoe UI" panose="020B0502040204020203" pitchFamily="34" charset="0"/>
+                      </a:endParaRPr>
+                    </a:p>
+                  </a:txBody>
+                  <a:tcPr marL="7620" marR="7620" marT="7620" marB="0" anchor="b"/>
+                </a:tc>
+                <a:tc>
+                  <a:txBody>
+                    <a:bodyPr/>
+                    <a:lstStyle/>
+                    <a:p>
+                      <a:pPr algn="r" fontAlgn="b"/>
+                      <a:r>
+                        <a:rPr lang="en-US" sz="1600" u="none" strike="noStrike">
+                          <a:effectLst/>
+                          <a:latin typeface="Segoe UI" panose="020B0502040204020203" pitchFamily="34" charset="0"/>
+                          <a:cs typeface="Segoe UI" panose="020B0502040204020203" pitchFamily="34" charset="0"/>
+                        </a:rPr>
+                        <a:t>3.3</a:t>
+                      </a:r>
+                      <a:endParaRPr lang="en-US" sz="1600" b="0" i="0" u="none" strike="noStrike">
+                        <a:solidFill>
+                          <a:srgbClr val="000000"/>
+                        </a:solidFill>
+                        <a:effectLst/>
+                        <a:latin typeface="Segoe UI" panose="020B0502040204020203" pitchFamily="34" charset="0"/>
+                        <a:cs typeface="Segoe UI" panose="020B0502040204020203" pitchFamily="34" charset="0"/>
+                      </a:endParaRPr>
+                    </a:p>
+                  </a:txBody>
+                  <a:tcPr marL="7620" marR="7620" marT="7620" marB="0" anchor="b"/>
+                </a:tc>
+                <a:tc>
+                  <a:txBody>
+                    <a:bodyPr/>
+                    <a:lstStyle/>
+                    <a:p>
+                      <a:pPr algn="r" fontAlgn="b"/>
+                      <a:r>
+                        <a:rPr lang="en-US" sz="1600" u="none" strike="noStrike">
+                          <a:effectLst/>
+                          <a:latin typeface="Segoe UI" panose="020B0502040204020203" pitchFamily="34" charset="0"/>
+                          <a:cs typeface="Segoe UI" panose="020B0502040204020203" pitchFamily="34" charset="0"/>
+                        </a:rPr>
+                        <a:t>50</a:t>
+                      </a:r>
+                      <a:endParaRPr lang="en-US" sz="1600" b="0" i="0" u="none" strike="noStrike">
+                        <a:solidFill>
+                          <a:srgbClr val="000000"/>
+                        </a:solidFill>
+                        <a:effectLst/>
+                        <a:latin typeface="Segoe UI" panose="020B0502040204020203" pitchFamily="34" charset="0"/>
+                        <a:cs typeface="Segoe UI" panose="020B0502040204020203" pitchFamily="34" charset="0"/>
+                      </a:endParaRPr>
+                    </a:p>
+                  </a:txBody>
+                  <a:tcPr marL="7620" marR="7620" marT="7620" marB="0" anchor="b"/>
+                </a:tc>
+                <a:tc>
+                  <a:txBody>
+                    <a:bodyPr/>
+                    <a:lstStyle/>
+                    <a:p>
+                      <a:pPr algn="r" fontAlgn="b"/>
+                      <a:r>
+                        <a:rPr lang="en-US" sz="1600" u="none" strike="noStrike">
+                          <a:effectLst/>
+                          <a:latin typeface="Segoe UI" panose="020B0502040204020203" pitchFamily="34" charset="0"/>
+                          <a:cs typeface="Segoe UI" panose="020B0502040204020203" pitchFamily="34" charset="0"/>
+                        </a:rPr>
+                        <a:t>11</a:t>
+                      </a:r>
+                      <a:endParaRPr lang="en-US" sz="1600" b="0" i="0" u="none" strike="noStrike">
+                        <a:solidFill>
+                          <a:srgbClr val="000000"/>
+                        </a:solidFill>
+                        <a:effectLst/>
+                        <a:latin typeface="Segoe UI" panose="020B0502040204020203" pitchFamily="34" charset="0"/>
+                        <a:cs typeface="Segoe UI" panose="020B0502040204020203" pitchFamily="34" charset="0"/>
+                      </a:endParaRPr>
+                    </a:p>
+                  </a:txBody>
+                  <a:tcPr marL="7620" marR="7620" marT="7620" marB="0" anchor="b"/>
+                </a:tc>
+                <a:tc>
+                  <a:txBody>
+                    <a:bodyPr/>
+                    <a:lstStyle/>
+                    <a:p>
+                      <a:pPr algn="r" fontAlgn="b"/>
+                      <a:r>
+                        <a:rPr lang="en-US" sz="1600" u="none" strike="noStrike">
+                          <a:effectLst/>
+                          <a:latin typeface="Segoe UI" panose="020B0502040204020203" pitchFamily="34" charset="0"/>
+                          <a:cs typeface="Segoe UI" panose="020B0502040204020203" pitchFamily="34" charset="0"/>
+                        </a:rPr>
+                        <a:t>17.5</a:t>
+                      </a:r>
+                      <a:endParaRPr lang="en-US" sz="1600" b="0" i="0" u="none" strike="noStrike">
+                        <a:solidFill>
+                          <a:srgbClr val="000000"/>
+                        </a:solidFill>
+                        <a:effectLst/>
+                        <a:latin typeface="Segoe UI" panose="020B0502040204020203" pitchFamily="34" charset="0"/>
+                        <a:cs typeface="Segoe UI" panose="020B0502040204020203" pitchFamily="34" charset="0"/>
+                      </a:endParaRPr>
+                    </a:p>
+                  </a:txBody>
+                  <a:tcPr marL="7620" marR="7620" marT="7620" marB="0" anchor="b"/>
+                </a:tc>
+                <a:tc>
+                  <a:txBody>
+                    <a:bodyPr/>
+                    <a:lstStyle/>
+                    <a:p>
+                      <a:pPr algn="r" fontAlgn="b"/>
+                      <a:r>
+                        <a:rPr lang="en-US" sz="1600" u="none" strike="noStrike" dirty="0">
+                          <a:effectLst/>
+                          <a:latin typeface="Segoe UI" panose="020B0502040204020203" pitchFamily="34" charset="0"/>
+                          <a:cs typeface="Segoe UI" panose="020B0502040204020203" pitchFamily="34" charset="0"/>
+                        </a:rPr>
+                        <a:t>2</a:t>
+                      </a:r>
+                      <a:endParaRPr lang="en-US" sz="1600" b="0" i="0" u="none" strike="noStrike" dirty="0">
+                        <a:solidFill>
+                          <a:srgbClr val="000000"/>
+                        </a:solidFill>
+                        <a:effectLst/>
+                        <a:latin typeface="Segoe UI" panose="020B0502040204020203" pitchFamily="34" charset="0"/>
+                        <a:cs typeface="Segoe UI" panose="020B0502040204020203" pitchFamily="34" charset="0"/>
+                      </a:endParaRPr>
+                    </a:p>
+                  </a:txBody>
+                  <a:tcPr marL="7620" marR="7620" marT="7620" marB="0" anchor="b"/>
+                </a:tc>
+                <a:tc>
+                  <a:txBody>
+                    <a:bodyPr/>
+                    <a:lstStyle/>
+                    <a:p>
+                      <a:pPr algn="r" fontAlgn="b"/>
+                      <a:r>
+                        <a:rPr lang="en-US" sz="1600" u="none" strike="noStrike">
+                          <a:effectLst/>
+                          <a:latin typeface="Segoe UI" panose="020B0502040204020203" pitchFamily="34" charset="0"/>
+                          <a:cs typeface="Segoe UI" panose="020B0502040204020203" pitchFamily="34" charset="0"/>
+                        </a:rPr>
+                        <a:t>16</a:t>
+                      </a:r>
+                      <a:endParaRPr lang="en-US" sz="1600" b="0" i="0" u="none" strike="noStrike">
+                        <a:solidFill>
+                          <a:srgbClr val="000000"/>
+                        </a:solidFill>
+                        <a:effectLst/>
+                        <a:latin typeface="Segoe UI" panose="020B0502040204020203" pitchFamily="34" charset="0"/>
+                        <a:cs typeface="Segoe UI" panose="020B0502040204020203" pitchFamily="34" charset="0"/>
+                      </a:endParaRPr>
+                    </a:p>
+                  </a:txBody>
+                  <a:tcPr marL="7620" marR="7620" marT="7620" marB="0" anchor="b"/>
+                </a:tc>
+                <a:extLst>
+                  <a:ext uri="{0D108BD9-81ED-4DB2-BD59-A6C34878D82A}">
+                    <a16:rowId xmlns:a16="http://schemas.microsoft.com/office/drawing/2014/main" val="3564527260"/>
+                  </a:ext>
+                </a:extLst>
+              </a:tr>
+              <a:tr h="613370">
+                <a:tc>
+                  <a:txBody>
+                    <a:bodyPr/>
+                    <a:lstStyle/>
+                    <a:p>
+                      <a:pPr algn="l" fontAlgn="b"/>
+                      <a:r>
+                        <a:rPr lang="en-US" sz="1600" u="none" strike="noStrike">
+                          <a:effectLst/>
+                          <a:latin typeface="Segoe UI" panose="020B0502040204020203" pitchFamily="34" charset="0"/>
+                          <a:cs typeface="Segoe UI" panose="020B0502040204020203" pitchFamily="34" charset="0"/>
+                        </a:rPr>
+                        <a:t>char-rnn</a:t>
+                      </a:r>
+                      <a:endParaRPr lang="en-US" sz="1600" b="0" i="0" u="none" strike="noStrike">
+                        <a:solidFill>
+                          <a:srgbClr val="000000"/>
+                        </a:solidFill>
+                        <a:effectLst/>
+                        <a:latin typeface="Segoe UI" panose="020B0502040204020203" pitchFamily="34" charset="0"/>
+                        <a:cs typeface="Segoe UI" panose="020B0502040204020203" pitchFamily="34" charset="0"/>
+                      </a:endParaRPr>
+                    </a:p>
+                  </a:txBody>
+                  <a:tcPr marL="7620" marR="7620" marT="7620" marB="0" anchor="b"/>
+                </a:tc>
+                <a:tc>
+                  <a:txBody>
+                    <a:bodyPr/>
+                    <a:lstStyle/>
+                    <a:p>
+                      <a:pPr algn="r" fontAlgn="b"/>
+                      <a:r>
+                        <a:rPr lang="en-US" sz="1600" u="none" strike="noStrike">
+                          <a:effectLst/>
+                          <a:latin typeface="Segoe UI" panose="020B0502040204020203" pitchFamily="34" charset="0"/>
+                          <a:cs typeface="Segoe UI" panose="020B0502040204020203" pitchFamily="34" charset="0"/>
+                        </a:rPr>
+                        <a:t>1.5</a:t>
+                      </a:r>
+                      <a:endParaRPr lang="en-US" sz="1600" b="0" i="0" u="none" strike="noStrike">
+                        <a:solidFill>
+                          <a:srgbClr val="000000"/>
+                        </a:solidFill>
+                        <a:effectLst/>
+                        <a:latin typeface="Segoe UI" panose="020B0502040204020203" pitchFamily="34" charset="0"/>
+                        <a:cs typeface="Segoe UI" panose="020B0502040204020203" pitchFamily="34" charset="0"/>
+                      </a:endParaRPr>
+                    </a:p>
+                  </a:txBody>
+                  <a:tcPr marL="7620" marR="7620" marT="7620" marB="0" anchor="b"/>
+                </a:tc>
+                <a:tc>
+                  <a:txBody>
+                    <a:bodyPr/>
+                    <a:lstStyle/>
+                    <a:p>
+                      <a:pPr algn="r" fontAlgn="b"/>
+                      <a:r>
+                        <a:rPr lang="en-US" sz="1600" u="none" strike="noStrike">
+                          <a:effectLst/>
+                          <a:latin typeface="Segoe UI" panose="020B0502040204020203" pitchFamily="34" charset="0"/>
+                          <a:cs typeface="Segoe UI" panose="020B0502040204020203" pitchFamily="34" charset="0"/>
+                        </a:rPr>
+                        <a:t>50</a:t>
+                      </a:r>
+                      <a:endParaRPr lang="en-US" sz="1600" b="0" i="0" u="none" strike="noStrike">
+                        <a:solidFill>
+                          <a:srgbClr val="000000"/>
+                        </a:solidFill>
+                        <a:effectLst/>
+                        <a:latin typeface="Segoe UI" panose="020B0502040204020203" pitchFamily="34" charset="0"/>
+                        <a:cs typeface="Segoe UI" panose="020B0502040204020203" pitchFamily="34" charset="0"/>
+                      </a:endParaRPr>
+                    </a:p>
+                  </a:txBody>
+                  <a:tcPr marL="7620" marR="7620" marT="7620" marB="0" anchor="b"/>
+                </a:tc>
+                <a:tc>
+                  <a:txBody>
+                    <a:bodyPr/>
+                    <a:lstStyle/>
+                    <a:p>
+                      <a:pPr algn="r" fontAlgn="b"/>
+                      <a:r>
+                        <a:rPr lang="en-US" sz="1600" u="none" strike="noStrike">
+                          <a:effectLst/>
+                          <a:latin typeface="Segoe UI" panose="020B0502040204020203" pitchFamily="34" charset="0"/>
+                          <a:cs typeface="Segoe UI" panose="020B0502040204020203" pitchFamily="34" charset="0"/>
+                        </a:rPr>
+                        <a:t>20</a:t>
+                      </a:r>
+                      <a:endParaRPr lang="en-US" sz="1600" b="0" i="0" u="none" strike="noStrike">
+                        <a:solidFill>
+                          <a:srgbClr val="000000"/>
+                        </a:solidFill>
+                        <a:effectLst/>
+                        <a:latin typeface="Segoe UI" panose="020B0502040204020203" pitchFamily="34" charset="0"/>
+                        <a:cs typeface="Segoe UI" panose="020B0502040204020203" pitchFamily="34" charset="0"/>
+                      </a:endParaRPr>
+                    </a:p>
+                  </a:txBody>
+                  <a:tcPr marL="7620" marR="7620" marT="7620" marB="0" anchor="b"/>
+                </a:tc>
+                <a:tc>
+                  <a:txBody>
+                    <a:bodyPr/>
+                    <a:lstStyle/>
+                    <a:p>
+                      <a:pPr algn="r" fontAlgn="b"/>
+                      <a:r>
+                        <a:rPr lang="en-US" sz="1600" u="none" strike="noStrike">
+                          <a:effectLst/>
+                          <a:latin typeface="Segoe UI" panose="020B0502040204020203" pitchFamily="34" charset="0"/>
+                          <a:cs typeface="Segoe UI" panose="020B0502040204020203" pitchFamily="34" charset="0"/>
+                        </a:rPr>
+                        <a:t>73.5</a:t>
+                      </a:r>
+                      <a:endParaRPr lang="en-US" sz="1600" b="0" i="0" u="none" strike="noStrike">
+                        <a:solidFill>
+                          <a:srgbClr val="000000"/>
+                        </a:solidFill>
+                        <a:effectLst/>
+                        <a:latin typeface="Segoe UI" panose="020B0502040204020203" pitchFamily="34" charset="0"/>
+                        <a:cs typeface="Segoe UI" panose="020B0502040204020203" pitchFamily="34" charset="0"/>
+                      </a:endParaRPr>
+                    </a:p>
+                  </a:txBody>
+                  <a:tcPr marL="7620" marR="7620" marT="7620" marB="0" anchor="b"/>
+                </a:tc>
+                <a:tc>
+                  <a:txBody>
+                    <a:bodyPr/>
+                    <a:lstStyle/>
+                    <a:p>
+                      <a:pPr algn="r" fontAlgn="b"/>
+                      <a:r>
+                        <a:rPr lang="en-US" sz="1600" u="none" strike="noStrike">
+                          <a:effectLst/>
+                          <a:latin typeface="Segoe UI" panose="020B0502040204020203" pitchFamily="34" charset="0"/>
+                          <a:cs typeface="Segoe UI" panose="020B0502040204020203" pitchFamily="34" charset="0"/>
+                        </a:rPr>
+                        <a:t>5</a:t>
+                      </a:r>
+                      <a:endParaRPr lang="en-US" sz="1600" b="0" i="0" u="none" strike="noStrike">
+                        <a:solidFill>
+                          <a:srgbClr val="000000"/>
+                        </a:solidFill>
+                        <a:effectLst/>
+                        <a:latin typeface="Segoe UI" panose="020B0502040204020203" pitchFamily="34" charset="0"/>
+                        <a:cs typeface="Segoe UI" panose="020B0502040204020203" pitchFamily="34" charset="0"/>
+                      </a:endParaRPr>
+                    </a:p>
+                  </a:txBody>
+                  <a:tcPr marL="7620" marR="7620" marT="7620" marB="0" anchor="b"/>
+                </a:tc>
+                <a:tc>
+                  <a:txBody>
+                    <a:bodyPr/>
+                    <a:lstStyle/>
+                    <a:p>
+                      <a:pPr algn="r" fontAlgn="b"/>
+                      <a:r>
+                        <a:rPr lang="en-US" sz="1600" u="none" strike="noStrike" dirty="0">
+                          <a:effectLst/>
+                          <a:latin typeface="Segoe UI" panose="020B0502040204020203" pitchFamily="34" charset="0"/>
+                          <a:cs typeface="Segoe UI" panose="020B0502040204020203" pitchFamily="34" charset="0"/>
+                        </a:rPr>
+                        <a:t>11</a:t>
+                      </a:r>
+                      <a:endParaRPr lang="en-US" sz="1600" b="0" i="0" u="none" strike="noStrike" dirty="0">
+                        <a:solidFill>
+                          <a:srgbClr val="000000"/>
+                        </a:solidFill>
+                        <a:effectLst/>
+                        <a:latin typeface="Segoe UI" panose="020B0502040204020203" pitchFamily="34" charset="0"/>
+                        <a:cs typeface="Segoe UI" panose="020B0502040204020203" pitchFamily="34" charset="0"/>
+                      </a:endParaRPr>
+                    </a:p>
+                  </a:txBody>
+                  <a:tcPr marL="7620" marR="7620" marT="7620" marB="0" anchor="b"/>
+                </a:tc>
+                <a:extLst>
+                  <a:ext uri="{0D108BD9-81ED-4DB2-BD59-A6C34878D82A}">
+                    <a16:rowId xmlns:a16="http://schemas.microsoft.com/office/drawing/2014/main" val="4267744723"/>
+                  </a:ext>
+                </a:extLst>
+              </a:tr>
+            </a:tbl>
+          </a:graphicData>
+        </a:graphic>
+      </p:graphicFrame>
+      <p:sp>
+        <p:nvSpPr>
+          <p:cNvPr id="5" name="TextBox 4">
+            <a:extLst>
+              <a:ext uri="{FF2B5EF4-FFF2-40B4-BE49-F238E27FC236}">
+                <a16:creationId xmlns:a16="http://schemas.microsoft.com/office/drawing/2014/main" id="{4380AD89-64B4-4AD5-BEB5-04AA4EA619AE}"/>
+              </a:ext>
+            </a:extLst>
+          </p:cNvPr>
+          <p:cNvSpPr txBox="1"/>
+          <p:nvPr/>
+        </p:nvSpPr>
+        <p:spPr>
+          <a:xfrm>
+            <a:off x="838200" y="1918610"/>
+            <a:ext cx="7490012" cy="1015663"/>
+          </a:xfrm>
+          <a:prstGeom prst="rect">
+            <a:avLst/>
+          </a:prstGeom>
+          <a:noFill/>
+        </p:spPr>
+        <p:txBody>
+          <a:bodyPr wrap="square" rtlCol="0">
+            <a:spAutoFit/>
+          </a:bodyPr>
           <a:lstStyle/>
           <a:p>
             <a:r>
-              <a:rPr lang="en-US" dirty="0"/>
-              <a:t>Come up with a objective evaluation metric to chose the best model</a:t>
-            </a:r>
-          </a:p>
-          <a:p>
-            <a:r>
-              <a:rPr lang="en-US" dirty="0"/>
-              <a:t>Try smaller/different dataset</a:t>
-            </a:r>
-          </a:p>
-          <a:p>
-            <a:endParaRPr lang="en-US" dirty="0"/>
-          </a:p>
-          <a:p>
-            <a:endParaRPr lang="en-US" dirty="0"/>
+              <a:rPr lang="en-US" sz="2000" dirty="0">
+                <a:solidFill>
+                  <a:schemeClr val="dk1"/>
+                </a:solidFill>
+              </a:rPr>
+              <a:t>Dropping </a:t>
+            </a:r>
+            <a:r>
+              <a:rPr lang="en-US" sz="2000" dirty="0" err="1">
+                <a:solidFill>
+                  <a:schemeClr val="dk1"/>
+                </a:solidFill>
+              </a:rPr>
+              <a:t>Kares</a:t>
+            </a:r>
+            <a:r>
+              <a:rPr lang="en-US" sz="2000" dirty="0">
+                <a:solidFill>
+                  <a:schemeClr val="dk1"/>
+                </a:solidFill>
+              </a:rPr>
+              <a:t> as it is </a:t>
+            </a:r>
+            <a:r>
+              <a:rPr lang="en-US" sz="2000" dirty="0" err="1">
+                <a:solidFill>
+                  <a:schemeClr val="dk1"/>
+                </a:solidFill>
+              </a:rPr>
+              <a:t>givingmemory</a:t>
+            </a:r>
+            <a:r>
+              <a:rPr lang="en-US" sz="2000" dirty="0">
+                <a:solidFill>
+                  <a:schemeClr val="dk1"/>
+                </a:solidFill>
+              </a:rPr>
+              <a:t> error</a:t>
+            </a:r>
+          </a:p>
+          <a:p>
+            <a:r>
+              <a:rPr lang="en-US" sz="2000" dirty="0">
+                <a:solidFill>
+                  <a:schemeClr val="dk1"/>
+                </a:solidFill>
+              </a:rPr>
+              <a:t>Dropping </a:t>
+            </a:r>
+            <a:r>
+              <a:rPr lang="en-US" sz="2000" dirty="0" err="1">
+                <a:solidFill>
+                  <a:schemeClr val="dk1"/>
+                </a:solidFill>
+              </a:rPr>
+              <a:t>Pytorch</a:t>
+            </a:r>
+            <a:r>
+              <a:rPr lang="en-US" sz="2000" dirty="0">
+                <a:solidFill>
+                  <a:schemeClr val="dk1"/>
+                </a:solidFill>
+              </a:rPr>
+              <a:t> as quality is not good</a:t>
+            </a:r>
+          </a:p>
+          <a:p>
+            <a:r>
+              <a:rPr lang="en-US" sz="2000" dirty="0">
+                <a:solidFill>
+                  <a:schemeClr val="dk1"/>
+                </a:solidFill>
+              </a:rPr>
+              <a:t>Comparison of Word-</a:t>
+            </a:r>
+            <a:r>
+              <a:rPr lang="en-US" sz="2000" dirty="0" err="1">
+                <a:solidFill>
+                  <a:schemeClr val="dk1"/>
+                </a:solidFill>
+              </a:rPr>
+              <a:t>rnn</a:t>
+            </a:r>
+            <a:r>
+              <a:rPr lang="en-US" sz="2000" dirty="0">
+                <a:solidFill>
+                  <a:schemeClr val="dk1"/>
+                </a:solidFill>
+              </a:rPr>
+              <a:t> and char-</a:t>
+            </a:r>
+            <a:r>
+              <a:rPr lang="en-US" sz="2000" dirty="0" err="1">
+                <a:solidFill>
+                  <a:schemeClr val="dk1"/>
+                </a:solidFill>
+              </a:rPr>
+              <a:t>rnn</a:t>
+            </a:r>
+            <a:r>
+              <a:rPr lang="en-US" sz="2000" dirty="0">
+                <a:solidFill>
+                  <a:schemeClr val="dk1"/>
+                </a:solidFill>
+              </a:rPr>
+              <a:t>:</a:t>
+            </a:r>
+          </a:p>
+        </p:txBody>
+      </p:sp>
+      <p:sp>
+        <p:nvSpPr>
+          <p:cNvPr id="6" name="TextBox 5">
+            <a:extLst>
+              <a:ext uri="{FF2B5EF4-FFF2-40B4-BE49-F238E27FC236}">
+                <a16:creationId xmlns:a16="http://schemas.microsoft.com/office/drawing/2014/main" id="{76643D43-E6F8-4438-ABFF-4DDF2685C7CF}"/>
+              </a:ext>
+            </a:extLst>
+          </p:cNvPr>
+          <p:cNvSpPr txBox="1"/>
+          <p:nvPr/>
+        </p:nvSpPr>
+        <p:spPr>
+          <a:xfrm>
+            <a:off x="838199" y="5230229"/>
+            <a:ext cx="7212872" cy="369332"/>
+          </a:xfrm>
+          <a:prstGeom prst="rect">
+            <a:avLst/>
+          </a:prstGeom>
+          <a:noFill/>
+        </p:spPr>
+        <p:txBody>
+          <a:bodyPr wrap="none" rtlCol="0">
+            <a:spAutoFit/>
+          </a:bodyPr>
+          <a:lstStyle/>
+          <a:p>
+            <a:r>
+              <a:rPr lang="en-US" dirty="0"/>
+              <a:t>Score = (Related Work * Epoch) / (Train Loss * Tome to run * Spelling Error)</a:t>
+            </a:r>
+          </a:p>
+        </p:txBody>
+      </p:sp>
+      <p:sp>
+        <p:nvSpPr>
+          <p:cNvPr id="7" name="TextBox 6">
+            <a:extLst>
+              <a:ext uri="{FF2B5EF4-FFF2-40B4-BE49-F238E27FC236}">
+                <a16:creationId xmlns:a16="http://schemas.microsoft.com/office/drawing/2014/main" id="{439E5311-3102-4AD7-B4D9-2ABD057C48F5}"/>
+              </a:ext>
+            </a:extLst>
+          </p:cNvPr>
+          <p:cNvSpPr txBox="1"/>
+          <p:nvPr/>
+        </p:nvSpPr>
+        <p:spPr>
+          <a:xfrm>
+            <a:off x="838199" y="5876365"/>
+            <a:ext cx="6154272" cy="369332"/>
+          </a:xfrm>
+          <a:prstGeom prst="rect">
+            <a:avLst/>
+          </a:prstGeom>
+          <a:noFill/>
+        </p:spPr>
+        <p:txBody>
+          <a:bodyPr wrap="square" rtlCol="0">
+            <a:spAutoFit/>
+          </a:bodyPr>
+          <a:lstStyle/>
+          <a:p>
+            <a:r>
+              <a:rPr lang="en-US" dirty="0"/>
+              <a:t>Decided to use word-</a:t>
+            </a:r>
+            <a:r>
+              <a:rPr lang="en-US" dirty="0" err="1"/>
+              <a:t>rnn</a:t>
+            </a:r>
+            <a:r>
+              <a:rPr lang="en-US" dirty="0"/>
+              <a:t> as the model for </a:t>
+            </a:r>
+            <a:r>
+              <a:rPr lang="en-US"/>
+              <a:t>the project</a:t>
+            </a:r>
           </a:p>
         </p:txBody>
       </p:sp>
     </p:spTree>
     <p:extLst>
       <p:ext uri="{BB962C8B-B14F-4D97-AF65-F5344CB8AC3E}">
-        <p14:creationId xmlns:p14="http://schemas.microsoft.com/office/powerpoint/2010/main" val="3162084255"/>
+        <p14:creationId xmlns:p14="http://schemas.microsoft.com/office/powerpoint/2010/main" val="1921275391"/>
       </p:ext>
     </p:extLst>
   </p:cSld>
@@ -5456,7 +6514,7 @@
           <p:cNvPr id="2" name="Title 1">
             <a:extLst>
               <a:ext uri="{FF2B5EF4-FFF2-40B4-BE49-F238E27FC236}">
-                <a16:creationId xmlns:a16="http://schemas.microsoft.com/office/drawing/2014/main" id="{322BE2FF-A4CF-42BB-B3D0-6A01C9DA0C2A}"/>
+                <a16:creationId xmlns:a16="http://schemas.microsoft.com/office/drawing/2014/main" id="{5588671A-D4B8-4227-B351-5C033E2A6025}"/>
               </a:ext>
             </a:extLst>
           </p:cNvPr>
@@ -5467,27 +6525,14 @@
             <p:ph type="title"/>
           </p:nvPr>
         </p:nvSpPr>
-        <p:spPr>
-          <a:xfrm>
-            <a:off x="0" y="18255"/>
-            <a:ext cx="10515600" cy="1325563"/>
-          </a:xfrm>
-        </p:spPr>
+        <p:spPr/>
         <p:txBody>
           <a:bodyPr/>
           <a:lstStyle/>
           <a:p>
             <a:r>
               <a:rPr lang="en-US" dirty="0"/>
-              <a:t>Char-</a:t>
-            </a:r>
-            <a:r>
-              <a:rPr lang="en-US" dirty="0" err="1"/>
-              <a:t>nn</a:t>
-            </a:r>
-            <a:r>
-              <a:rPr lang="en-US" dirty="0"/>
-              <a:t> evaluation (1/2)</a:t>
+              <a:t>Next Evaluation Steps</a:t>
             </a:r>
           </a:p>
         </p:txBody>
@@ -5497,7 +6542,7 @@
           <p:cNvPr id="3" name="Content Placeholder 2">
             <a:extLst>
               <a:ext uri="{FF2B5EF4-FFF2-40B4-BE49-F238E27FC236}">
-                <a16:creationId xmlns:a16="http://schemas.microsoft.com/office/drawing/2014/main" id="{BA479CED-2A2D-4262-AFEC-6CEB19121B36}"/>
+                <a16:creationId xmlns:a16="http://schemas.microsoft.com/office/drawing/2014/main" id="{1E548DD6-CD28-4F65-8A95-06E8FBD8D25E}"/>
               </a:ext>
             </a:extLst>
           </p:cNvPr>
@@ -5508,257 +6553,34 @@
             <p:ph idx="1"/>
           </p:nvPr>
         </p:nvSpPr>
-        <p:spPr>
-          <a:xfrm>
-            <a:off x="477672" y="1241946"/>
-            <a:ext cx="11614244" cy="4935017"/>
-          </a:xfrm>
-        </p:spPr>
-        <p:txBody>
-          <a:bodyPr>
-            <a:normAutofit fontScale="62500" lnSpcReduction="20000"/>
-          </a:bodyPr>
+        <p:spPr/>
+        <p:txBody>
+          <a:bodyPr/>
           <a:lstStyle/>
           <a:p>
-            <a:pPr marL="0" indent="0">
-              <a:buNone/>
-            </a:pPr>
-            <a:r>
-              <a:rPr lang="en-US" b="1" dirty="0"/>
-              <a:t>Model Name: </a:t>
-            </a:r>
-            <a:r>
-              <a:rPr lang="en-US" dirty="0"/>
-              <a:t>Char-</a:t>
-            </a:r>
-            <a:r>
-              <a:rPr lang="en-US" dirty="0" err="1"/>
-              <a:t>nn</a:t>
-            </a:r>
-            <a:r>
-              <a:rPr lang="en-US" dirty="0"/>
-              <a:t> with </a:t>
-            </a:r>
-            <a:r>
-              <a:rPr lang="en-US" dirty="0" err="1"/>
-              <a:t>Tensorflow</a:t>
-            </a:r>
+            <a:r>
+              <a:rPr lang="en-US" dirty="0"/>
+              <a:t>Come up with a objective evaluation metric to chose the best model</a:t>
+            </a:r>
+          </a:p>
+          <a:p>
+            <a:r>
+              <a:rPr lang="en-US" dirty="0"/>
+              <a:t>Try smaller/different dataset</a:t>
+            </a:r>
+          </a:p>
+          <a:p>
             <a:endParaRPr lang="en-US" dirty="0"/>
           </a:p>
           <a:p>
-            <a:pPr marL="0" indent="0">
-              <a:buNone/>
-            </a:pPr>
-            <a:r>
-              <a:rPr lang="en-US" b="1" dirty="0"/>
-              <a:t>GitHub Repo: </a:t>
-            </a:r>
-            <a:r>
-              <a:rPr lang="en-US" dirty="0"/>
-              <a:t>https://github.com/sherjilozair/char-rnn-tensorflow</a:t>
-            </a:r>
-          </a:p>
-          <a:p>
-            <a:pPr marL="0" indent="0">
-              <a:buNone/>
-            </a:pPr>
-            <a:r>
-              <a:rPr lang="en-US" b="1" dirty="0"/>
-              <a:t>Run </a:t>
-            </a:r>
-            <a:r>
-              <a:rPr lang="en-US" dirty="0"/>
-              <a:t>- 2</a:t>
-            </a:r>
-          </a:p>
-          <a:p>
-            <a:pPr marL="0" indent="0">
-              <a:buNone/>
-            </a:pPr>
-            <a:r>
-              <a:rPr lang="en-US" b="1" dirty="0"/>
-              <a:t>Time to run</a:t>
-            </a:r>
-            <a:r>
-              <a:rPr lang="en-US" dirty="0"/>
-              <a:t>: 2 hours</a:t>
-            </a:r>
-          </a:p>
-          <a:p>
-            <a:pPr marL="0" indent="0">
-              <a:buNone/>
-            </a:pPr>
-            <a:r>
-              <a:rPr lang="en-US" b="1" dirty="0"/>
-              <a:t>Data Set Size</a:t>
-            </a:r>
-            <a:r>
-              <a:rPr lang="en-US" dirty="0"/>
-              <a:t>: no special characters/reduced size dataset - 5mb</a:t>
-            </a:r>
-          </a:p>
-          <a:p>
-            <a:pPr marL="0" indent="0">
-              <a:buNone/>
-            </a:pPr>
-            <a:r>
-              <a:rPr lang="en-US" b="1" dirty="0"/>
-              <a:t>Quality of output</a:t>
-            </a:r>
-            <a:r>
-              <a:rPr lang="en-US" dirty="0"/>
-              <a:t>: apparently to produce </a:t>
-            </a:r>
-            <a:r>
-              <a:rPr lang="en-US" dirty="0" err="1"/>
-              <a:t>allbazz</a:t>
-            </a:r>
-            <a:r>
-              <a:rPr lang="en-US" dirty="0"/>
-              <a:t> with the occasional traditional particularly laidback drummer john really rhythm as a </a:t>
-            </a:r>
-            <a:r>
-              <a:rPr lang="en-US" dirty="0" err="1"/>
-              <a:t>singersongwriter</a:t>
-            </a:r>
-            <a:r>
-              <a:rPr lang="en-US" dirty="0"/>
-              <a:t> so often occasionally poorly has released its pretty as the </a:t>
-            </a:r>
-            <a:r>
-              <a:rPr lang="en-US" dirty="0" err="1"/>
-              <a:t>blowfield</a:t>
-            </a:r>
-            <a:r>
-              <a:rPr lang="en-US" dirty="0"/>
-              <a:t> of such a third regard summit with that much that has only released somewhere between and proven paper lyrics are lucky repetitive drumming on the plan for some sort of trail off your soul as they do in early 80s so long on is positively explicit throughout the tempo ilk </a:t>
-            </a:r>
-            <a:r>
-              <a:rPr lang="en-US" dirty="0" err="1"/>
-              <a:t>veloso</a:t>
-            </a:r>
-            <a:r>
-              <a:rPr lang="en-US" dirty="0"/>
-              <a:t> deadly was this flusher of be here moves and last nights is some pleasure synths incorporated as the </a:t>
-            </a:r>
-            <a:r>
-              <a:rPr lang="en-US" dirty="0" err="1"/>
-              <a:t>cardighs</a:t>
-            </a:r>
-            <a:r>
-              <a:rPr lang="en-US" dirty="0"/>
-              <a:t> and </a:t>
-            </a:r>
-            <a:r>
-              <a:rPr lang="en-US" dirty="0" err="1"/>
-              <a:t>sandviching</a:t>
-            </a:r>
-            <a:r>
-              <a:rPr lang="en-US" dirty="0"/>
-              <a:t> the or hooked up all the songs but when it becomes the consistent chord change that turns not to mention the rest of the </a:t>
-            </a:r>
-            <a:r>
-              <a:rPr lang="en-US" dirty="0" err="1"/>
-              <a:t>fullestruck</a:t>
-            </a:r>
-            <a:r>
-              <a:rPr lang="en-US" dirty="0"/>
-              <a:t> dc </a:t>
-            </a:r>
-            <a:r>
-              <a:rPr lang="en-US" dirty="0" err="1"/>
-              <a:t>ida</a:t>
-            </a:r>
-            <a:r>
-              <a:rPr lang="en-US" dirty="0"/>
-              <a:t> record </a:t>
-            </a:r>
-            <a:r>
-              <a:rPr lang="en-US" dirty="0" err="1"/>
-              <a:t>matthew</a:t>
-            </a:r>
-            <a:r>
-              <a:rPr lang="en-US" dirty="0"/>
-              <a:t> fury and then </a:t>
-            </a:r>
-            <a:r>
-              <a:rPr lang="en-US" dirty="0" err="1"/>
-              <a:t>youll</a:t>
-            </a:r>
-            <a:r>
-              <a:rPr lang="en-US" dirty="0"/>
-              <a:t> have gratuitously generated where </a:t>
-            </a:r>
-            <a:r>
-              <a:rPr lang="en-US" dirty="0" err="1"/>
-              <a:t>i</a:t>
-            </a:r>
-            <a:r>
-              <a:rPr lang="en-US" dirty="0"/>
-              <a:t> was born to offer the guy we have to keep things feel by past spacemen 3 greens </a:t>
-            </a:r>
-            <a:r>
-              <a:rPr lang="en-US" dirty="0" err="1"/>
-              <a:t>steven</a:t>
-            </a:r>
-            <a:r>
-              <a:rPr lang="en-US" dirty="0"/>
-              <a:t> mans grievous </a:t>
-            </a:r>
-            <a:r>
-              <a:rPr lang="en-US" dirty="0" err="1"/>
-              <a:t>gabriels</a:t>
-            </a:r>
-            <a:r>
-              <a:rPr lang="en-US" dirty="0"/>
-              <a:t> on the status to child and odd results later combined”</a:t>
-            </a:r>
-          </a:p>
-          <a:p>
-            <a:pPr marL="0" indent="0">
-              <a:buNone/>
-            </a:pPr>
-            <a:r>
-              <a:rPr lang="en-US" b="1" dirty="0"/>
-              <a:t>No of epochs</a:t>
-            </a:r>
-            <a:r>
-              <a:rPr lang="en-US" dirty="0"/>
-              <a:t>: 20</a:t>
-            </a:r>
-          </a:p>
-          <a:p>
-            <a:pPr marL="0" indent="0">
-              <a:buNone/>
-            </a:pPr>
-            <a:r>
-              <a:rPr lang="en-US" b="1" dirty="0"/>
-              <a:t>Final Train Loss</a:t>
-            </a:r>
-            <a:r>
-              <a:rPr lang="en-US" dirty="0"/>
-              <a:t>: 1.002</a:t>
-            </a:r>
-          </a:p>
-          <a:p>
-            <a:pPr marL="0" indent="0">
-              <a:buNone/>
-            </a:pPr>
-            <a:r>
-              <a:rPr lang="en-US" b="1" dirty="0"/>
-              <a:t>Conclusion</a:t>
-            </a:r>
-            <a:r>
-              <a:rPr lang="en-US" dirty="0"/>
-              <a:t>: The reduced size dataset of around 5mb with no special characters, could be trained in around 2 hours for 20 epochs, to achieve a final train loss of around 1, which is quite decent. Hyperparameter tuning would be required to optimize it further. Overall, the model has potential, with training time being the major challenge.</a:t>
-            </a:r>
+            <a:endParaRPr lang="en-US" dirty="0"/>
           </a:p>
         </p:txBody>
       </p:sp>
     </p:spTree>
     <p:extLst>
       <p:ext uri="{BB962C8B-B14F-4D97-AF65-F5344CB8AC3E}">
-        <p14:creationId xmlns:p14="http://schemas.microsoft.com/office/powerpoint/2010/main" val="31311347"/>
+        <p14:creationId xmlns:p14="http://schemas.microsoft.com/office/powerpoint/2010/main" val="3162084255"/>
       </p:ext>
     </p:extLst>
   </p:cSld>
@@ -5821,7 +6643,7 @@
             </a:r>
             <a:r>
               <a:rPr lang="en-US" dirty="0"/>
-              <a:t> evaluation (2/2)</a:t>
+              <a:t> evaluation (1/2)</a:t>
             </a:r>
           </a:p>
         </p:txBody>
@@ -5850,7 +6672,7 @@
         </p:spPr>
         <p:txBody>
           <a:bodyPr>
-            <a:normAutofit fontScale="77500" lnSpcReduction="20000"/>
+            <a:normAutofit fontScale="62500" lnSpcReduction="20000"/>
           </a:bodyPr>
           <a:lstStyle/>
           <a:p>
@@ -5902,7 +6724,7 @@
             </a:r>
             <a:r>
               <a:rPr lang="en-US" dirty="0"/>
-              <a:t>- 1</a:t>
+              <a:t>- 2</a:t>
             </a:r>
           </a:p>
           <a:p>
@@ -5915,7 +6737,7 @@
             </a:r>
             <a:r>
               <a:rPr lang="en-US" dirty="0"/>
-              <a:t>: 8 hours</a:t>
+              <a:t>: 2 hours</a:t>
             </a:r>
           </a:p>
           <a:p>
@@ -5928,7 +6750,7 @@
             </a:r>
             <a:r>
               <a:rPr lang="en-US" dirty="0"/>
-              <a:t>: Full dataset - 70mb</a:t>
+              <a:t>: no special characters/reduced size dataset - 5mb</a:t>
             </a:r>
           </a:p>
           <a:p>
@@ -5941,79 +6763,111 @@
             </a:r>
             <a:r>
               <a:rPr lang="en-US" dirty="0"/>
-              <a:t>: This sink, an option that falls bitch. The title track by playing its own freedom phase to still about being much terribly that Wall, that Das just have never really been hearing the price of full solo down the original trickles of </a:t>
+              <a:t>: apparently to produce </a:t>
             </a:r>
             <a:r>
               <a:rPr lang="en-US" dirty="0" err="1"/>
-              <a:t>Malkmic’s</a:t>
-            </a:r>
-            <a:r>
-              <a:rPr lang="en-US" dirty="0"/>
-              <a:t> giants on </a:t>
+              <a:t>allbazz</a:t>
+            </a:r>
+            <a:r>
+              <a:rPr lang="en-US" dirty="0"/>
+              <a:t> with the occasional traditional particularly laidback drummer john really rhythm as a </a:t>
             </a:r>
             <a:r>
               <a:rPr lang="en-US" dirty="0" err="1"/>
-              <a:t>Tujus</a:t>
-            </a:r>
-            <a:r>
-              <a:rPr lang="en-US" dirty="0"/>
-              <a:t> Prodigy, but </a:t>
+              <a:t>singersongwriter</a:t>
+            </a:r>
+            <a:r>
+              <a:rPr lang="en-US" dirty="0"/>
+              <a:t> so often occasionally poorly has released its pretty as the </a:t>
             </a:r>
             <a:r>
               <a:rPr lang="en-US" dirty="0" err="1"/>
-              <a:t>sorta</a:t>
-            </a:r>
-            <a:r>
-              <a:rPr lang="en-US" dirty="0"/>
-              <a:t> former </a:t>
+              <a:t>blowfield</a:t>
+            </a:r>
+            <a:r>
+              <a:rPr lang="en-US" dirty="0"/>
+              <a:t> of such a third regard summit with that much that has only released somewhere between and proven paper lyrics are lucky repetitive drumming on the plan for some sort of trail off your soul as they do in early 80s so long on is positively explicit throughout the tempo ilk </a:t>
             </a:r>
             <a:r>
               <a:rPr lang="en-US" dirty="0" err="1"/>
-              <a:t>Homties</a:t>
-            </a:r>
-            <a:r>
-              <a:rPr lang="en-US" dirty="0"/>
-              <a:t> have </a:t>
+              <a:t>veloso</a:t>
+            </a:r>
+            <a:r>
+              <a:rPr lang="en-US" dirty="0"/>
+              <a:t> deadly was this flusher of be here moves and last nights is some pleasure synths incorporated as the </a:t>
             </a:r>
             <a:r>
               <a:rPr lang="en-US" dirty="0" err="1"/>
-              <a:t>shoke</a:t>
-            </a:r>
-            <a:r>
-              <a:rPr lang="en-US" dirty="0"/>
-              <a:t> jam by Freddie </a:t>
+              <a:t>cardighs</a:t>
+            </a:r>
+            <a:r>
+              <a:rPr lang="en-US" dirty="0"/>
+              <a:t> and </a:t>
             </a:r>
             <a:r>
               <a:rPr lang="en-US" dirty="0" err="1"/>
-              <a:t>Scisn.Contemporary</a:t>
-            </a:r>
-            <a:r>
-              <a:rPr lang="en-US" dirty="0"/>
-              <a:t> mutual and, it’s easy to hopefully keep wrong </a:t>
+              <a:t>sandviching</a:t>
+            </a:r>
+            <a:r>
+              <a:rPr lang="en-US" dirty="0"/>
+              <a:t> the or hooked up all the songs but when it becomes the consistent chord change that turns not to mention the rest of the </a:t>
             </a:r>
             <a:r>
               <a:rPr lang="en-US" dirty="0" err="1"/>
-              <a:t>herself.Fall</a:t>
-            </a:r>
-            <a:r>
-              <a:rPr lang="en-US" dirty="0"/>
-              <a:t> blow my own friend but simply the </a:t>
+              <a:t>fullestruck</a:t>
+            </a:r>
+            <a:r>
+              <a:rPr lang="en-US" dirty="0"/>
+              <a:t> dc </a:t>
             </a:r>
             <a:r>
               <a:rPr lang="en-US" dirty="0" err="1"/>
-              <a:t>quicksane</a:t>
-            </a:r>
-            <a:r>
-              <a:rPr lang="en-US" dirty="0"/>
-              <a:t> hip-hop, getting playfully delivered forces and </a:t>
+              <a:t>ida</a:t>
+            </a:r>
+            <a:r>
+              <a:rPr lang="en-US" dirty="0"/>
+              <a:t> record </a:t>
             </a:r>
             <a:r>
               <a:rPr lang="en-US" dirty="0" err="1"/>
-              <a:t>clas</a:t>
-            </a:r>
-            <a:r>
-              <a:rPr lang="en-US" dirty="0"/>
-              <a:t>.</a:t>
+              <a:t>matthew</a:t>
+            </a:r>
+            <a:r>
+              <a:rPr lang="en-US" dirty="0"/>
+              <a:t> fury and then </a:t>
+            </a:r>
+            <a:r>
+              <a:rPr lang="en-US" dirty="0" err="1"/>
+              <a:t>youll</a:t>
+            </a:r>
+            <a:r>
+              <a:rPr lang="en-US" dirty="0"/>
+              <a:t> have gratuitously generated where </a:t>
+            </a:r>
+            <a:r>
+              <a:rPr lang="en-US" dirty="0" err="1"/>
+              <a:t>i</a:t>
+            </a:r>
+            <a:r>
+              <a:rPr lang="en-US" dirty="0"/>
+              <a:t> was born to offer the guy we have to keep things feel by past spacemen 3 greens </a:t>
+            </a:r>
+            <a:r>
+              <a:rPr lang="en-US" dirty="0" err="1"/>
+              <a:t>steven</a:t>
+            </a:r>
+            <a:r>
+              <a:rPr lang="en-US" dirty="0"/>
+              <a:t> mans grievous </a:t>
+            </a:r>
+            <a:r>
+              <a:rPr lang="en-US" dirty="0" err="1"/>
+              <a:t>gabriels</a:t>
+            </a:r>
+            <a:r>
+              <a:rPr lang="en-US" dirty="0"/>
+              <a:t> on the status to child and odd results later combined”</a:t>
             </a:r>
           </a:p>
           <a:p>
@@ -6026,7 +6880,7 @@
             </a:r>
             <a:r>
               <a:rPr lang="en-US" dirty="0"/>
-              <a:t>: 3</a:t>
+              <a:t>: 20</a:t>
             </a:r>
           </a:p>
           <a:p>
@@ -6039,7 +6893,7 @@
             </a:r>
             <a:r>
               <a:rPr lang="en-US" dirty="0"/>
-              <a:t>: 1.4</a:t>
+              <a:t>: 1.002</a:t>
             </a:r>
           </a:p>
           <a:p>
@@ -6052,29 +6906,15 @@
             </a:r>
             <a:r>
               <a:rPr lang="en-US" dirty="0"/>
-              <a:t>: The entire dataset could be trained for only 3 epochs in around 8 hours using a virtual machine with </a:t>
-            </a:r>
-            <a:r>
-              <a:rPr lang="en-US" dirty="0" err="1"/>
-              <a:t>gpu</a:t>
-            </a:r>
-            <a:r>
-              <a:rPr lang="en-US" dirty="0"/>
-              <a:t> in Aws. The resulting training loss is not ideal, and needs to be further optimized, by figuring out how to reduce the training time.</a:t>
-            </a:r>
-          </a:p>
-          <a:p>
-            <a:pPr marL="0" indent="0">
-              <a:buNone/>
-            </a:pPr>
-            <a:endParaRPr lang="en-US" dirty="0"/>
+              <a:t>: The reduced size dataset of around 5mb with no special characters, could be trained in around 2 hours for 20 epochs, to achieve a final train loss of around 1, which is quite decent. Hyperparameter tuning would be required to optimize it further. Overall, the model has potential, with training time being the major challenge.</a:t>
+            </a:r>
           </a:p>
         </p:txBody>
       </p:sp>
     </p:spTree>
     <p:extLst>
       <p:ext uri="{BB962C8B-B14F-4D97-AF65-F5344CB8AC3E}">
-        <p14:creationId xmlns:p14="http://schemas.microsoft.com/office/powerpoint/2010/main" val="694587656"/>
+        <p14:creationId xmlns:p14="http://schemas.microsoft.com/office/powerpoint/2010/main" val="31311347"/>
       </p:ext>
     </p:extLst>
   </p:cSld>
@@ -6129,23 +6969,15 @@
           <a:p>
             <a:r>
               <a:rPr lang="en-US" dirty="0"/>
-              <a:t>word-</a:t>
+              <a:t>Char-</a:t>
             </a:r>
             <a:r>
               <a:rPr lang="en-US" dirty="0" err="1"/>
-              <a:t>rnn</a:t>
-            </a:r>
-            <a:r>
-              <a:rPr lang="en-US" dirty="0"/>
-              <a:t>-</a:t>
-            </a:r>
-            <a:r>
-              <a:rPr lang="en-US" dirty="0" err="1"/>
-              <a:t>tensorflow</a:t>
-            </a:r>
-            <a:r>
-              <a:rPr lang="en-US" dirty="0"/>
-              <a:t> evaluation</a:t>
+              <a:t>nn</a:t>
+            </a:r>
+            <a:r>
+              <a:rPr lang="en-US" dirty="0"/>
+              <a:t> evaluation (2/2)</a:t>
             </a:r>
           </a:p>
         </p:txBody>
@@ -6174,7 +7006,7 @@
         </p:spPr>
         <p:txBody>
           <a:bodyPr>
-            <a:normAutofit fontScale="62500" lnSpcReduction="20000"/>
+            <a:normAutofit fontScale="77500" lnSpcReduction="20000"/>
           </a:bodyPr>
           <a:lstStyle/>
           <a:p>
@@ -6187,19 +7019,19 @@
             </a:r>
             <a:r>
               <a:rPr lang="en-US" dirty="0"/>
-              <a:t>word-</a:t>
+              <a:t>Char-</a:t>
             </a:r>
             <a:r>
               <a:rPr lang="en-US" dirty="0" err="1"/>
-              <a:t>rnn</a:t>
-            </a:r>
-            <a:r>
-              <a:rPr lang="en-US" dirty="0"/>
-              <a:t>-</a:t>
+              <a:t>nn</a:t>
+            </a:r>
+            <a:r>
+              <a:rPr lang="en-US" dirty="0"/>
+              <a:t> with </a:t>
             </a:r>
             <a:r>
               <a:rPr lang="en-US" dirty="0" err="1"/>
-              <a:t>tensorflow</a:t>
+              <a:t>Tensorflow</a:t>
             </a:r>
             <a:endParaRPr lang="en-US" dirty="0"/>
           </a:p>
@@ -6209,9 +7041,12 @@
             </a:pPr>
             <a:r>
               <a:rPr lang="en-US" b="1" dirty="0"/>
-              <a:t>GitHub Repo: https://github.com/hunkim/word-rnn-tensorflow</a:t>
-            </a:r>
-            <a:endParaRPr lang="en-US" dirty="0"/>
+              <a:t>GitHub Repo: </a:t>
+            </a:r>
+            <a:r>
+              <a:rPr lang="en-US" dirty="0"/>
+              <a:t>https://github.com/sherjilozair/char-rnn-tensorflow</a:t>
+            </a:r>
           </a:p>
           <a:p>
             <a:pPr marL="0" indent="0">
@@ -6236,7 +7071,7 @@
             </a:r>
             <a:r>
               <a:rPr lang="en-US" dirty="0"/>
-              <a:t>: 1.7 hours</a:t>
+              <a:t>: 8 hours</a:t>
             </a:r>
           </a:p>
           <a:p>
@@ -6249,7 +7084,7 @@
             </a:r>
             <a:r>
               <a:rPr lang="en-US" dirty="0"/>
-              <a:t>: no special characters/reduced size dataset - 5mb</a:t>
+              <a:t>: Full dataset - 70mb</a:t>
             </a:r>
           </a:p>
           <a:p>
@@ -6262,79 +7097,79 @@
             </a:r>
             <a:r>
               <a:rPr lang="en-US" dirty="0"/>
-              <a:t>: frat album soon its what is a criticism with it well have become a 75 not forget that things first purchase is angry sweet reckless and poorly some new effects days they did no problem with our careers on skylarking and </a:t>
+              <a:t>: This sink, an option that falls bitch. The title track by playing its own freedom phase to still about being much terribly that Wall, that Das just have never really been hearing the price of full solo down the original trickles of </a:t>
             </a:r>
             <a:r>
               <a:rPr lang="en-US" dirty="0" err="1"/>
-              <a:t>radioheads</a:t>
-            </a:r>
-            <a:r>
-              <a:rPr lang="en-US" dirty="0"/>
-              <a:t> other effort </a:t>
+              <a:t>Malkmic’s</a:t>
+            </a:r>
+            <a:r>
+              <a:rPr lang="en-US" dirty="0"/>
+              <a:t> giants on </a:t>
             </a:r>
             <a:r>
               <a:rPr lang="en-US" dirty="0" err="1"/>
-              <a:t>sparhawks</a:t>
-            </a:r>
-            <a:r>
-              <a:rPr lang="en-US" dirty="0"/>
-              <a:t> points if not to say the ramifications from death cab for cutie turn their website shamelessly contained into the downtrodden elements of it the only one these songs check the trek from the tombs seeks picking a leap back to pretty long moments from its most listenable revealing new genre a photograph and good songs id sound like ever at no records </a:t>
+              <a:t>Tujus</a:t>
+            </a:r>
+            <a:r>
+              <a:rPr lang="en-US" dirty="0"/>
+              <a:t> Prodigy, but </a:t>
             </a:r>
             <a:r>
               <a:rPr lang="en-US" dirty="0" err="1"/>
-              <a:t>ive</a:t>
-            </a:r>
-            <a:r>
-              <a:rPr lang="en-US" dirty="0"/>
-              <a:t> been dreading deaf for his </a:t>
+              <a:t>sorta</a:t>
+            </a:r>
+            <a:r>
+              <a:rPr lang="en-US" dirty="0"/>
+              <a:t> former </a:t>
             </a:r>
             <a:r>
               <a:rPr lang="en-US" dirty="0" err="1"/>
-              <a:t>pisstakes</a:t>
-            </a:r>
-            <a:r>
-              <a:rPr lang="en-US" dirty="0"/>
-              <a:t> and misdirection was just too good that the opening tracks here might be the show </a:t>
+              <a:t>Homties</a:t>
+            </a:r>
+            <a:r>
+              <a:rPr lang="en-US" dirty="0"/>
+              <a:t> have </a:t>
             </a:r>
             <a:r>
               <a:rPr lang="en-US" dirty="0" err="1"/>
-              <a:t>i</a:t>
-            </a:r>
-            <a:r>
-              <a:rPr lang="en-US" dirty="0"/>
-              <a:t> was conceived but whereas the </a:t>
+              <a:t>shoke</a:t>
+            </a:r>
+            <a:r>
+              <a:rPr lang="en-US" dirty="0"/>
+              <a:t> jam by Freddie </a:t>
             </a:r>
             <a:r>
               <a:rPr lang="en-US" dirty="0" err="1"/>
-              <a:t>hattifatteners</a:t>
-            </a:r>
-            <a:r>
-              <a:rPr lang="en-US" dirty="0"/>
-              <a:t> fights labels over this record at least if </a:t>
+              <a:t>Scisn.Contemporary</a:t>
+            </a:r>
+            <a:r>
+              <a:rPr lang="en-US" dirty="0"/>
+              <a:t> mutual and, it’s easy to hopefully keep wrong </a:t>
             </a:r>
             <a:r>
               <a:rPr lang="en-US" dirty="0" err="1"/>
-              <a:t>theres</a:t>
-            </a:r>
-            <a:r>
-              <a:rPr lang="en-US" dirty="0"/>
-              <a:t> only the most weird thing in the background labeled a club done but it goes spastic back in the country and miss </a:t>
+              <a:t>herself.Fall</a:t>
+            </a:r>
+            <a:r>
+              <a:rPr lang="en-US" dirty="0"/>
+              <a:t> blow my own friend but simply the </a:t>
             </a:r>
             <a:r>
               <a:rPr lang="en-US" dirty="0" err="1"/>
-              <a:t>sunday</a:t>
-            </a:r>
-            <a:r>
-              <a:rPr lang="en-US" dirty="0"/>
-              <a:t> experiments that mentioned the entire end of this </a:t>
+              <a:t>quicksane</a:t>
+            </a:r>
+            <a:r>
+              <a:rPr lang="en-US" dirty="0"/>
+              <a:t> hip-hop, getting playfully delivered forces and </a:t>
             </a:r>
             <a:r>
               <a:rPr lang="en-US" dirty="0" err="1"/>
-              <a:t>reviewnow</a:t>
-            </a:r>
-            <a:r>
-              <a:rPr lang="en-US" dirty="0"/>
-              <a:t> that the next time christening themselves something better toby was as often sorely bad to hear valid tracks by bringing apart the haphazard connection</a:t>
+              <a:t>clas</a:t>
+            </a:r>
+            <a:r>
+              <a:rPr lang="en-US" dirty="0"/>
+              <a:t>.</a:t>
             </a:r>
           </a:p>
           <a:p>
@@ -6347,7 +7182,7 @@
             </a:r>
             <a:r>
               <a:rPr lang="en-US" dirty="0"/>
-              <a:t>: 50</a:t>
+              <a:t>: 3</a:t>
             </a:r>
           </a:p>
           <a:p>
@@ -6360,7 +7195,7 @@
             </a:r>
             <a:r>
               <a:rPr lang="en-US" dirty="0"/>
-              <a:t>: 3.8</a:t>
+              <a:t>: 1.4</a:t>
             </a:r>
           </a:p>
           <a:p>
@@ -6373,15 +7208,29 @@
             </a:r>
             <a:r>
               <a:rPr lang="en-US" dirty="0"/>
-              <a:t>: This model was only possible to run with partial dataset. With full dataset of 70 MB, the model was very slow and will have taken 5.3 days to train.</a:t>
-            </a:r>
+              <a:t>: The entire dataset could be trained for only 3 epochs in around 8 hours using a virtual machine with </a:t>
+            </a:r>
+            <a:r>
+              <a:rPr lang="en-US" dirty="0" err="1"/>
+              <a:t>gpu</a:t>
+            </a:r>
+            <a:r>
+              <a:rPr lang="en-US" dirty="0"/>
+              <a:t> in Aws. The resulting training loss is not ideal, and needs to be further optimized, by figuring out how to reduce the training time.</a:t>
+            </a:r>
+          </a:p>
+          <a:p>
+            <a:pPr marL="0" indent="0">
+              <a:buNone/>
+            </a:pPr>
+            <a:endParaRPr lang="en-US" dirty="0"/>
           </a:p>
         </p:txBody>
       </p:sp>
     </p:spTree>
     <p:extLst>
       <p:ext uri="{BB962C8B-B14F-4D97-AF65-F5344CB8AC3E}">
-        <p14:creationId xmlns:p14="http://schemas.microsoft.com/office/powerpoint/2010/main" val="2823949481"/>
+        <p14:creationId xmlns:p14="http://schemas.microsoft.com/office/powerpoint/2010/main" val="694587656"/>
       </p:ext>
     </p:extLst>
   </p:cSld>
@@ -6436,11 +7285,19 @@
           <a:p>
             <a:r>
               <a:rPr lang="en-US" dirty="0"/>
-              <a:t>char-</a:t>
+              <a:t>word-</a:t>
             </a:r>
             <a:r>
               <a:rPr lang="en-US" dirty="0" err="1"/>
-              <a:t>rnn.pytorch</a:t>
+              <a:t>rnn</a:t>
+            </a:r>
+            <a:r>
+              <a:rPr lang="en-US" dirty="0"/>
+              <a:t>-</a:t>
+            </a:r>
+            <a:r>
+              <a:rPr lang="en-US" dirty="0" err="1"/>
+              <a:t>tensorflow</a:t>
             </a:r>
             <a:r>
               <a:rPr lang="en-US" dirty="0"/>
@@ -6473,7 +7330,7 @@
         </p:spPr>
         <p:txBody>
           <a:bodyPr>
-            <a:normAutofit fontScale="92500" lnSpcReduction="10000"/>
+            <a:normAutofit fontScale="62500" lnSpcReduction="20000"/>
           </a:bodyPr>
           <a:lstStyle/>
           <a:p>
@@ -6486,11 +7343,19 @@
             </a:r>
             <a:r>
               <a:rPr lang="en-US" dirty="0"/>
-              <a:t>char-</a:t>
+              <a:t>word-</a:t>
             </a:r>
             <a:r>
               <a:rPr lang="en-US" dirty="0" err="1"/>
-              <a:t>rnn.pytorch</a:t>
+              <a:t>rnn</a:t>
+            </a:r>
+            <a:r>
+              <a:rPr lang="en-US" dirty="0"/>
+              <a:t>-</a:t>
+            </a:r>
+            <a:r>
+              <a:rPr lang="en-US" dirty="0" err="1"/>
+              <a:t>tensorflow</a:t>
             </a:r>
             <a:endParaRPr lang="en-US" dirty="0"/>
           </a:p>
@@ -6500,12 +7365,9 @@
             </a:pPr>
             <a:r>
               <a:rPr lang="en-US" b="1" dirty="0"/>
-              <a:t>GitHub Repo: </a:t>
-            </a:r>
-            <a:r>
-              <a:rPr lang="en-US" dirty="0"/>
-              <a:t>https://github.com/spro/char-rnn.pytorch</a:t>
-            </a:r>
+              <a:t>GitHub Repo: https://github.com/hunkim/word-rnn-tensorflow</a:t>
+            </a:r>
+            <a:endParaRPr lang="en-US" dirty="0"/>
           </a:p>
           <a:p>
             <a:pPr marL="0" indent="0">
@@ -6530,7 +7392,7 @@
             </a:r>
             <a:r>
               <a:rPr lang="en-US" dirty="0"/>
-              <a:t>: 20 mts</a:t>
+              <a:t>: 1.7 hours</a:t>
             </a:r>
           </a:p>
           <a:p>
@@ -6543,7 +7405,7 @@
             </a:r>
             <a:r>
               <a:rPr lang="en-US" dirty="0"/>
-              <a:t>: no special characters – 8.6 mb</a:t>
+              <a:t>: no special characters/reduced size dataset - 5mb</a:t>
             </a:r>
           </a:p>
           <a:p>
@@ -6556,32 +7418,79 @@
             </a:r>
             <a:r>
               <a:rPr lang="en-US" dirty="0"/>
-              <a:t>: that a </a:t>
+              <a:t>: frat album soon its what is a criticism with it well have become a 75 not forget that things first purchase is angry sweet reckless and poorly some new effects days they did no problem with our careers on skylarking and </a:t>
             </a:r>
             <a:r>
               <a:rPr lang="en-US" dirty="0" err="1"/>
-              <a:t>delain</a:t>
-            </a:r>
-            <a:r>
-              <a:rPr lang="en-US" dirty="0"/>
-              <a:t> course the rock by space the</a:t>
-            </a:r>
-          </a:p>
-          <a:p>
-            <a:pPr marL="0" indent="0">
-              <a:buNone/>
-            </a:pPr>
-            <a:r>
-              <a:rPr lang="en-US" dirty="0"/>
-              <a:t> piano is experiment that her be a prince you </a:t>
+              <a:t>radioheads</a:t>
+            </a:r>
+            <a:r>
+              <a:rPr lang="en-US" dirty="0"/>
+              <a:t> other effort </a:t>
             </a:r>
             <a:r>
               <a:rPr lang="en-US" dirty="0" err="1"/>
-              <a:t>naudi</a:t>
-            </a:r>
-            <a:r>
-              <a:rPr lang="en-US" dirty="0"/>
-              <a:t> </a:t>
+              <a:t>sparhawks</a:t>
+            </a:r>
+            <a:r>
+              <a:rPr lang="en-US" dirty="0"/>
+              <a:t> points if not to say the ramifications from death cab for cutie turn their website shamelessly contained into the downtrodden elements of it the only one these songs check the trek from the tombs seeks picking a leap back to pretty long moments from its most listenable revealing new genre a photograph and good songs id sound like ever at no records </a:t>
+            </a:r>
+            <a:r>
+              <a:rPr lang="en-US" dirty="0" err="1"/>
+              <a:t>ive</a:t>
+            </a:r>
+            <a:r>
+              <a:rPr lang="en-US" dirty="0"/>
+              <a:t> been dreading deaf for his </a:t>
+            </a:r>
+            <a:r>
+              <a:rPr lang="en-US" dirty="0" err="1"/>
+              <a:t>pisstakes</a:t>
+            </a:r>
+            <a:r>
+              <a:rPr lang="en-US" dirty="0"/>
+              <a:t> and misdirection was just too good that the opening tracks here might be the show </a:t>
+            </a:r>
+            <a:r>
+              <a:rPr lang="en-US" dirty="0" err="1"/>
+              <a:t>i</a:t>
+            </a:r>
+            <a:r>
+              <a:rPr lang="en-US" dirty="0"/>
+              <a:t> was conceived but whereas the </a:t>
+            </a:r>
+            <a:r>
+              <a:rPr lang="en-US" dirty="0" err="1"/>
+              <a:t>hattifatteners</a:t>
+            </a:r>
+            <a:r>
+              <a:rPr lang="en-US" dirty="0"/>
+              <a:t> fights labels over this record at least if </a:t>
+            </a:r>
+            <a:r>
+              <a:rPr lang="en-US" dirty="0" err="1"/>
+              <a:t>theres</a:t>
+            </a:r>
+            <a:r>
+              <a:rPr lang="en-US" dirty="0"/>
+              <a:t> only the most weird thing in the background labeled a club done but it goes spastic back in the country and miss </a:t>
+            </a:r>
+            <a:r>
+              <a:rPr lang="en-US" dirty="0" err="1"/>
+              <a:t>sunday</a:t>
+            </a:r>
+            <a:r>
+              <a:rPr lang="en-US" dirty="0"/>
+              <a:t> experiments that mentioned the entire end of this </a:t>
+            </a:r>
+            <a:r>
+              <a:rPr lang="en-US" dirty="0" err="1"/>
+              <a:t>reviewnow</a:t>
+            </a:r>
+            <a:r>
+              <a:rPr lang="en-US" dirty="0"/>
+              <a:t> that the next time christening themselves something better toby was as often sorely bad to hear valid tracks by bringing apart the haphazard connection</a:t>
             </a:r>
           </a:p>
           <a:p>
@@ -6594,7 +7503,7 @@
             </a:r>
             <a:r>
               <a:rPr lang="en-US" dirty="0"/>
-              <a:t>: 2000</a:t>
+              <a:t>: 50</a:t>
             </a:r>
           </a:p>
           <a:p>
@@ -6607,7 +7516,7 @@
             </a:r>
             <a:r>
               <a:rPr lang="en-US" dirty="0"/>
-              <a:t>: 1.5147</a:t>
+              <a:t>: 3.8</a:t>
             </a:r>
           </a:p>
           <a:p>
@@ -6620,7 +7529,7 @@
             </a:r>
             <a:r>
               <a:rPr lang="en-US" dirty="0"/>
-              <a:t>: this model might be very simple so the output quality is not optimal. However, very quick and simple to train.</a:t>
+              <a:t>: This model was only possible to run with partial dataset. With full dataset of 70 MB, the model was very slow and will have taken 5.3 days to train.</a:t>
             </a:r>
           </a:p>
         </p:txBody>
@@ -6628,7 +7537,7 @@
     </p:spTree>
     <p:extLst>
       <p:ext uri="{BB962C8B-B14F-4D97-AF65-F5344CB8AC3E}">
-        <p14:creationId xmlns:p14="http://schemas.microsoft.com/office/powerpoint/2010/main" val="617092275"/>
+        <p14:creationId xmlns:p14="http://schemas.microsoft.com/office/powerpoint/2010/main" val="2823949481"/>
       </p:ext>
     </p:extLst>
   </p:cSld>
@@ -6682,8 +7591,12 @@
           <a:lstStyle/>
           <a:p>
             <a:r>
+              <a:rPr lang="en-US" dirty="0"/>
+              <a:t>char-</a:t>
+            </a:r>
+            <a:r>
               <a:rPr lang="en-US" dirty="0" err="1"/>
-              <a:t>Keras</a:t>
+              <a:t>rnn.pytorch</a:t>
             </a:r>
             <a:r>
               <a:rPr lang="en-US" dirty="0"/>
@@ -6716,7 +7629,7 @@
         </p:spPr>
         <p:txBody>
           <a:bodyPr>
-            <a:normAutofit/>
+            <a:normAutofit fontScale="92500" lnSpcReduction="10000"/>
           </a:bodyPr>
           <a:lstStyle/>
           <a:p>
@@ -6728,8 +7641,12 @@
               <a:t>Model Name: </a:t>
             </a:r>
             <a:r>
+              <a:rPr lang="en-US" dirty="0"/>
+              <a:t>char-</a:t>
+            </a:r>
+            <a:r>
               <a:rPr lang="en-US" dirty="0" err="1"/>
-              <a:t>Keras</a:t>
+              <a:t>rnn.pytorch</a:t>
             </a:r>
             <a:endParaRPr lang="en-US" dirty="0"/>
           </a:p>
@@ -6743,7 +7660,7 @@
             </a:r>
             <a:r>
               <a:rPr lang="en-US" dirty="0"/>
-              <a:t>https://github.com/keras-team/keras</a:t>
+              <a:t>https://github.com/spro/char-rnn.pytorch</a:t>
             </a:r>
           </a:p>
           <a:p>
@@ -6769,15 +7686,7 @@
             </a:r>
             <a:r>
               <a:rPr lang="en-US" dirty="0"/>
-              <a:t>: 60 </a:t>
-            </a:r>
-            <a:r>
-              <a:rPr lang="en-US" dirty="0" err="1"/>
-              <a:t>hrs</a:t>
-            </a:r>
-            <a:r>
-              <a:rPr lang="en-US" dirty="0"/>
-              <a:t> on AWS if run</a:t>
+              <a:t>: 20 mts</a:t>
             </a:r>
           </a:p>
           <a:p>
@@ -6790,7 +7699,7 @@
             </a:r>
             <a:r>
               <a:rPr lang="en-US" dirty="0"/>
-              <a:t>: no special characters - 70mb</a:t>
+              <a:t>: no special characters – 8.6 mb</a:t>
             </a:r>
           </a:p>
           <a:p>
@@ -6803,7 +7712,32 @@
             </a:r>
             <a:r>
               <a:rPr lang="en-US" dirty="0"/>
-              <a:t>: NA</a:t>
+              <a:t>: that a </a:t>
+            </a:r>
+            <a:r>
+              <a:rPr lang="en-US" dirty="0" err="1"/>
+              <a:t>delain</a:t>
+            </a:r>
+            <a:r>
+              <a:rPr lang="en-US" dirty="0"/>
+              <a:t> course the rock by space the</a:t>
+            </a:r>
+          </a:p>
+          <a:p>
+            <a:pPr marL="0" indent="0">
+              <a:buNone/>
+            </a:pPr>
+            <a:r>
+              <a:rPr lang="en-US" dirty="0"/>
+              <a:t> piano is experiment that her be a prince you </a:t>
+            </a:r>
+            <a:r>
+              <a:rPr lang="en-US" dirty="0" err="1"/>
+              <a:t>naudi</a:t>
+            </a:r>
+            <a:r>
+              <a:rPr lang="en-US" dirty="0"/>
+              <a:t> </a:t>
             </a:r>
           </a:p>
           <a:p>
@@ -6816,7 +7750,7 @@
             </a:r>
             <a:r>
               <a:rPr lang="en-US" dirty="0"/>
-              <a:t>: 60</a:t>
+              <a:t>: 2000</a:t>
             </a:r>
           </a:p>
           <a:p>
@@ -6829,7 +7763,7 @@
             </a:r>
             <a:r>
               <a:rPr lang="en-US" dirty="0"/>
-              <a:t>: NA</a:t>
+              <a:t>: 1.5147</a:t>
             </a:r>
           </a:p>
           <a:p>
@@ -6842,7 +7776,7 @@
             </a:r>
             <a:r>
               <a:rPr lang="en-US" dirty="0"/>
-              <a:t>: Very slow. Training will not finish </a:t>
+              <a:t>: this model might be very simple so the output quality is not optimal. However, very quick and simple to train.</a:t>
             </a:r>
           </a:p>
         </p:txBody>
@@ -6850,7 +7784,7 @@
     </p:spTree>
     <p:extLst>
       <p:ext uri="{BB962C8B-B14F-4D97-AF65-F5344CB8AC3E}">
-        <p14:creationId xmlns:p14="http://schemas.microsoft.com/office/powerpoint/2010/main" val="1998563858"/>
+        <p14:creationId xmlns:p14="http://schemas.microsoft.com/office/powerpoint/2010/main" val="617092275"/>
       </p:ext>
     </p:extLst>
   </p:cSld>

</xml_diff>